<commit_message>
Made Competition slide a table.
</commit_message>
<xml_diff>
--- a/BikeDeedPitchDeck.pptx
+++ b/BikeDeedPitchDeck.pptx
@@ -119,7 +119,7 @@
   </p:defaultTextStyle>
   <p:extLst>
     <p:ext uri="{EFAFB233-063F-42B5-8137-9DF3F51BA10A}">
-      <p15:sldGuideLst xmlns="" xmlns:p15="http://schemas.microsoft.com/office/powerpoint/2012/main">
+      <p15:sldGuideLst xmlns:p15="http://schemas.microsoft.com/office/powerpoint/2012/main" xmlns="">
         <p15:guide id="1" orient="horz" pos="2160">
           <p15:clr>
             <a:srgbClr val="A4A3A4"/>
@@ -218,7 +218,7 @@
           <a:p>
             <a:fld id="{28AB948B-60F8-F843-A237-0070858B7880}" type="datetimeFigureOut">
               <a:rPr lang="en-US" smtClean="0"/>
-              <a:t>10/8/18</a:t>
+              <a:t>10/9/18</a:t>
             </a:fld>
             <a:endParaRPr lang="en-US"/>
           </a:p>
@@ -749,7 +749,7 @@
           <a:p>
             <a:fld id="{6BFECD78-3C8E-49F2-8FAB-59489D168ABB}" type="datetimeFigureOut">
               <a:rPr lang="en-US" smtClean="0"/>
-              <a:t>10/8/18</a:t>
+              <a:t>10/9/18</a:t>
             </a:fld>
             <a:endParaRPr lang="en-US" dirty="0"/>
           </a:p>
@@ -917,7 +917,7 @@
           <a:p>
             <a:fld id="{6BFECD78-3C8E-49F2-8FAB-59489D168ABB}" type="datetimeFigureOut">
               <a:rPr lang="en-US" smtClean="0"/>
-              <a:t>10/8/18</a:t>
+              <a:t>10/9/18</a:t>
             </a:fld>
             <a:endParaRPr lang="en-US" dirty="0"/>
           </a:p>
@@ -1095,7 +1095,7 @@
           <a:p>
             <a:fld id="{6BFECD78-3C8E-49F2-8FAB-59489D168ABB}" type="datetimeFigureOut">
               <a:rPr lang="en-US" smtClean="0"/>
-              <a:t>10/8/18</a:t>
+              <a:t>10/9/18</a:t>
             </a:fld>
             <a:endParaRPr lang="en-US" dirty="0"/>
           </a:p>
@@ -1263,7 +1263,7 @@
           <a:p>
             <a:fld id="{6BFECD78-3C8E-49F2-8FAB-59489D168ABB}" type="datetimeFigureOut">
               <a:rPr lang="en-US" smtClean="0"/>
-              <a:t>10/8/18</a:t>
+              <a:t>10/9/18</a:t>
             </a:fld>
             <a:endParaRPr lang="en-US" dirty="0"/>
           </a:p>
@@ -1508,7 +1508,7 @@
           <a:p>
             <a:fld id="{6BFECD78-3C8E-49F2-8FAB-59489D168ABB}" type="datetimeFigureOut">
               <a:rPr lang="en-US" smtClean="0"/>
-              <a:t>10/8/18</a:t>
+              <a:t>10/9/18</a:t>
             </a:fld>
             <a:endParaRPr lang="en-US" dirty="0"/>
           </a:p>
@@ -1793,7 +1793,7 @@
           <a:p>
             <a:fld id="{6BFECD78-3C8E-49F2-8FAB-59489D168ABB}" type="datetimeFigureOut">
               <a:rPr lang="en-US" smtClean="0"/>
-              <a:t>10/8/18</a:t>
+              <a:t>10/9/18</a:t>
             </a:fld>
             <a:endParaRPr lang="en-US" dirty="0"/>
           </a:p>
@@ -2212,7 +2212,7 @@
           <a:p>
             <a:fld id="{6BFECD78-3C8E-49F2-8FAB-59489D168ABB}" type="datetimeFigureOut">
               <a:rPr lang="en-US" smtClean="0"/>
-              <a:t>10/8/18</a:t>
+              <a:t>10/9/18</a:t>
             </a:fld>
             <a:endParaRPr lang="en-US" dirty="0"/>
           </a:p>
@@ -2329,7 +2329,7 @@
           <a:p>
             <a:fld id="{6BFECD78-3C8E-49F2-8FAB-59489D168ABB}" type="datetimeFigureOut">
               <a:rPr lang="en-US" smtClean="0"/>
-              <a:t>10/8/18</a:t>
+              <a:t>10/9/18</a:t>
             </a:fld>
             <a:endParaRPr lang="en-US" dirty="0"/>
           </a:p>
@@ -2424,7 +2424,7 @@
           <a:p>
             <a:fld id="{6BFECD78-3C8E-49F2-8FAB-59489D168ABB}" type="datetimeFigureOut">
               <a:rPr lang="en-US" smtClean="0"/>
-              <a:t>10/8/18</a:t>
+              <a:t>10/9/18</a:t>
             </a:fld>
             <a:endParaRPr lang="en-US" dirty="0"/>
           </a:p>
@@ -2699,7 +2699,7 @@
           <a:p>
             <a:fld id="{6BFECD78-3C8E-49F2-8FAB-59489D168ABB}" type="datetimeFigureOut">
               <a:rPr lang="en-US" smtClean="0"/>
-              <a:t>10/8/18</a:t>
+              <a:t>10/9/18</a:t>
             </a:fld>
             <a:endParaRPr lang="en-US" dirty="0"/>
           </a:p>
@@ -2954,7 +2954,7 @@
           <a:p>
             <a:fld id="{6BFECD78-3C8E-49F2-8FAB-59489D168ABB}" type="datetimeFigureOut">
               <a:rPr lang="en-US" smtClean="0"/>
-              <a:t>10/8/18</a:t>
+              <a:t>10/9/18</a:t>
             </a:fld>
             <a:endParaRPr lang="en-US" dirty="0"/>
           </a:p>
@@ -3165,7 +3165,7 @@
           <a:p>
             <a:fld id="{6BFECD78-3C8E-49F2-8FAB-59489D168ABB}" type="datetimeFigureOut">
               <a:rPr lang="en-US" smtClean="0"/>
-              <a:t>10/8/18</a:t>
+              <a:t>10/9/18</a:t>
             </a:fld>
             <a:endParaRPr lang="en-US" dirty="0"/>
           </a:p>
@@ -3568,9 +3568,6 @@
               </a:rPr>
               <a:t>BLOCKCHAIN PROTECTED.</a:t>
             </a:r>
-            <a:endParaRPr lang="en-US" sz="2400" dirty="0" smtClean="0">
-              <a:latin typeface="Vermin Vibes 2"/>
-            </a:endParaRPr>
           </a:p>
           <a:p>
             <a:endParaRPr lang="en-US" sz="2400" dirty="0">
@@ -3634,7 +3631,7 @@
           <p:cNvPr id="7" name="Picture 6">
             <a:extLst>
               <a:ext uri="{FF2B5EF4-FFF2-40B4-BE49-F238E27FC236}">
-                <a16:creationId xmlns="" xmlns:a16="http://schemas.microsoft.com/office/drawing/2014/main" id="{DEE28063-91C2-4C83-8465-9352D9DA93FB}"/>
+                <a16:creationId xmlns:a16="http://schemas.microsoft.com/office/drawing/2014/main" xmlns="" id="{DEE28063-91C2-4C83-8465-9352D9DA93FB}"/>
               </a:ext>
             </a:extLst>
           </p:cNvPr>
@@ -3823,7 +3820,15 @@
             </a:pPr>
             <a:r>
               <a:rPr lang="en-US" dirty="0"/>
-              <a:t>The Minimum Viable Product is up and running on the </a:t>
+              <a:t>The </a:t>
+            </a:r>
+            <a:r>
+              <a:rPr lang="en-US" dirty="0" smtClean="0"/>
+              <a:t>Minimal </a:t>
+            </a:r>
+            <a:r>
+              <a:rPr lang="en-US" dirty="0"/>
+              <a:t>Viable Product is up and running on the </a:t>
             </a:r>
             <a:r>
               <a:rPr lang="en-US" dirty="0" err="1"/>
@@ -3865,7 +3870,7 @@
           <p:cNvPr id="6" name="Picture 5">
             <a:extLst>
               <a:ext uri="{FF2B5EF4-FFF2-40B4-BE49-F238E27FC236}">
-                <a16:creationId xmlns="" xmlns:a16="http://schemas.microsoft.com/office/drawing/2014/main" id="{4C24787B-3860-4821-B65F-1B57A65A7EB8}"/>
+                <a16:creationId xmlns:a16="http://schemas.microsoft.com/office/drawing/2014/main" xmlns="" id="{4C24787B-3860-4821-B65F-1B57A65A7EB8}"/>
               </a:ext>
             </a:extLst>
           </p:cNvPr>
@@ -4351,7 +4356,15 @@
             </a:pPr>
             <a:r>
               <a:rPr lang="en-US" sz="3200" dirty="0" smtClean="0"/>
-              <a:t>There is virtually no authoritative source of data about individual bikes that are bought, sold, stolen, recovered, or maintained, anywhere in the world.</a:t>
+              <a:t>There is virtually no authoritative source </a:t>
+            </a:r>
+            <a:r>
+              <a:rPr lang="en-US" sz="3200" dirty="0" smtClean="0"/>
+              <a:t>of information </a:t>
+            </a:r>
+            <a:r>
+              <a:rPr lang="en-US" sz="3200" dirty="0" smtClean="0"/>
+              <a:t>about individual bikes that are bought, sold, stolen, recovered, or maintained, anywhere in the world.</a:t>
             </a:r>
           </a:p>
           <a:p>
@@ -4456,9 +4469,19 @@
         <p:spPr/>
         <p:txBody>
           <a:bodyPr>
-            <a:normAutofit fontScale="92500" lnSpcReduction="20000"/>
+            <a:normAutofit lnSpcReduction="10000"/>
           </a:bodyPr>
           <a:lstStyle/>
+          <a:p>
+            <a:pPr marL="400050" lvl="1" indent="0">
+              <a:buNone/>
+            </a:pPr>
+            <a:endParaRPr lang="en-US" sz="3200" dirty="0" smtClean="0">
+              <a:solidFill>
+                <a:srgbClr val="FFFFFF"/>
+              </a:solidFill>
+            </a:endParaRPr>
+          </a:p>
           <a:p>
             <a:pPr marL="400050" lvl="1" indent="0">
               <a:buNone/>
@@ -4477,7 +4500,15 @@
                   <a:srgbClr val="FFFF00"/>
                 </a:solidFill>
               </a:rPr>
-              <a:t> Universal, Public, Borderless </a:t>
+              <a:t> </a:t>
+            </a:r>
+            <a:r>
+              <a:rPr lang="en-US" sz="3200" dirty="0" smtClean="0">
+                <a:solidFill>
+                  <a:srgbClr val="FFFF00"/>
+                </a:solidFill>
+              </a:rPr>
+              <a:t>Universal, Public, Borderless </a:t>
             </a:r>
             <a:r>
               <a:rPr lang="en-US" sz="3200" dirty="0" smtClean="0">
@@ -4485,7 +4516,62 @@
                   <a:srgbClr val="FFFFFF"/>
                 </a:solidFill>
               </a:rPr>
-              <a:t>Repository for Bike data.  A</a:t>
+              <a:t>Ecosystem </a:t>
+            </a:r>
+            <a:r>
+              <a:rPr lang="en-US" sz="3200" dirty="0" smtClean="0">
+                <a:solidFill>
+                  <a:srgbClr val="FFFFFF"/>
+                </a:solidFill>
+              </a:rPr>
+              <a:t>for </a:t>
+            </a:r>
+            <a:r>
+              <a:rPr lang="en-US" sz="3200" dirty="0" smtClean="0">
+                <a:solidFill>
+                  <a:srgbClr val="FFFFFF"/>
+                </a:solidFill>
+              </a:rPr>
+              <a:t>Bike </a:t>
+            </a:r>
+            <a:r>
+              <a:rPr lang="en-US" sz="3200" dirty="0" smtClean="0">
+                <a:solidFill>
+                  <a:srgbClr val="FFFFFF"/>
+                </a:solidFill>
+              </a:rPr>
+              <a:t>information</a:t>
+            </a:r>
+            <a:r>
+              <a:rPr lang="en-US" sz="3200" dirty="0" smtClean="0">
+                <a:solidFill>
+                  <a:srgbClr val="FFFFFF"/>
+                </a:solidFill>
+              </a:rPr>
+              <a:t>.  </a:t>
+            </a:r>
+          </a:p>
+          <a:p>
+            <a:pPr marL="400050" lvl="1" indent="0">
+              <a:buNone/>
+            </a:pPr>
+            <a:endParaRPr lang="en-US" sz="3200" dirty="0">
+              <a:solidFill>
+                <a:srgbClr val="FFFFFF"/>
+              </a:solidFill>
+            </a:endParaRPr>
+          </a:p>
+          <a:p>
+            <a:pPr marL="400050" lvl="1" indent="0" algn="ctr">
+              <a:buNone/>
+            </a:pPr>
+            <a:r>
+              <a:rPr lang="en-US" sz="3200" dirty="0">
+                <a:solidFill>
+                  <a:srgbClr val="FFFFFF"/>
+                </a:solidFill>
+              </a:rPr>
+              <a:t>A</a:t>
             </a:r>
             <a:r>
               <a:rPr lang="en-US" sz="3200" dirty="0" smtClean="0">
@@ -4526,57 +4612,6 @@
               <a:buNone/>
             </a:pPr>
             <a:endParaRPr lang="en-US" sz="3200" dirty="0"/>
-          </a:p>
-          <a:p>
-            <a:pPr marL="914400" lvl="1" indent="-514350">
-              <a:buFont typeface="Arial"/>
-              <a:buChar char="•"/>
-            </a:pPr>
-            <a:r>
-              <a:rPr lang="en-US" sz="3200" dirty="0" smtClean="0"/>
-              <a:t>Ownership data.</a:t>
-            </a:r>
-          </a:p>
-          <a:p>
-            <a:pPr marL="914400" lvl="1" indent="-514350">
-              <a:buFont typeface="Arial"/>
-              <a:buChar char="•"/>
-            </a:pPr>
-            <a:r>
-              <a:rPr lang="en-US" sz="3200" dirty="0" smtClean="0"/>
-              <a:t>Supply Chain data. </a:t>
-            </a:r>
-          </a:p>
-          <a:p>
-            <a:pPr marL="914400" lvl="1" indent="-514350">
-              <a:buFont typeface="Arial"/>
-              <a:buChar char="•"/>
-            </a:pPr>
-            <a:r>
-              <a:rPr lang="en-US" sz="3200" dirty="0" smtClean="0"/>
-              <a:t>Theft and Recovery data.</a:t>
-            </a:r>
-          </a:p>
-          <a:p>
-            <a:pPr marL="857250" lvl="1" indent="-457200">
-              <a:buFont typeface="Arial"/>
-              <a:buChar char="•"/>
-            </a:pPr>
-            <a:r>
-              <a:rPr lang="en-US" sz="3200" dirty="0" smtClean="0"/>
-              <a:t>Maintenance data.</a:t>
-            </a:r>
-          </a:p>
-          <a:p>
-            <a:pPr marL="914400" lvl="1" indent="-514350">
-              <a:buFont typeface="Arial"/>
-              <a:buChar char="•"/>
-            </a:pPr>
-            <a:r>
-              <a:rPr lang="en-US" sz="3200" dirty="0" smtClean="0"/>
-              <a:t>Component/Valuation data.</a:t>
-            </a:r>
-            <a:endParaRPr lang="en-US" sz="3200" dirty="0" smtClean="0"/>
           </a:p>
           <a:p>
             <a:pPr marL="400050" lvl="1" indent="0" algn="ctr">
@@ -4828,7 +4863,6 @@
               <a:rPr lang="en-US" sz="2400" dirty="0" smtClean="0"/>
               <a:t>ollars per year.</a:t>
             </a:r>
-            <a:endParaRPr lang="en-US" sz="2400" dirty="0" smtClean="0"/>
           </a:p>
           <a:p>
             <a:r>
@@ -4859,29 +4893,7 @@
                   </a:schemeClr>
                 </a:solidFill>
               </a:rPr>
-              <a:t>ross</a:t>
-            </a:r>
-            <a:r>
-              <a:rPr lang="en-US" b="1" dirty="0" smtClean="0">
-                <a:solidFill>
-                  <a:schemeClr val="bg1">
-                    <a:lumMod val="75000"/>
-                    <a:lumOff val="25000"/>
-                  </a:schemeClr>
-                </a:solidFill>
-              </a:rPr>
-              <a:t>-sales of B</a:t>
-            </a:r>
-            <a:r>
-              <a:rPr lang="en-US" b="1" dirty="0" smtClean="0">
-                <a:solidFill>
-                  <a:schemeClr val="bg1">
-                    <a:lumMod val="75000"/>
-                    <a:lumOff val="25000"/>
-                  </a:schemeClr>
-                </a:solidFill>
-              </a:rPr>
-              <a:t>ikes and Components.</a:t>
+              <a:t>ross-sales of Bikes and Components.</a:t>
             </a:r>
             <a:endParaRPr lang="en-US" b="1" dirty="0">
               <a:solidFill>
@@ -4902,11 +4914,7 @@
             </a:r>
             <a:r>
               <a:rPr lang="en-US" sz="2400" dirty="0" smtClean="0"/>
-              <a:t>Bike Product sales </a:t>
-            </a:r>
-            <a:r>
-              <a:rPr lang="en-US" sz="2400" dirty="0" smtClean="0"/>
-              <a:t>are projected </a:t>
+              <a:t>Bike Product sales are projected </a:t>
             </a:r>
             <a:r>
               <a:rPr lang="en-US" sz="2400" dirty="0"/>
@@ -5016,15 +5024,7 @@
             </a:pPr>
             <a:r>
               <a:rPr lang="en-US" sz="2400" dirty="0" smtClean="0"/>
-              <a:t>     Up to </a:t>
-            </a:r>
-            <a:r>
-              <a:rPr lang="en-US" sz="2400" dirty="0" smtClean="0"/>
-              <a:t>10</a:t>
-            </a:r>
-            <a:r>
-              <a:rPr lang="en-US" sz="2400" dirty="0" smtClean="0"/>
-              <a:t> </a:t>
+              <a:t>     Up to 10 </a:t>
             </a:r>
             <a:r>
               <a:rPr lang="mr-IN" sz="2400" dirty="0" smtClean="0"/>
@@ -5032,39 +5032,7 @@
             </a:r>
             <a:r>
               <a:rPr lang="en-US" sz="2400" dirty="0" smtClean="0"/>
-              <a:t> </a:t>
-            </a:r>
-            <a:r>
-              <a:rPr lang="en-US" sz="2400" dirty="0" smtClean="0"/>
-              <a:t>15</a:t>
-            </a:r>
-            <a:r>
-              <a:rPr lang="en-US" sz="2400" dirty="0" smtClean="0"/>
-              <a:t>% </a:t>
-            </a:r>
-            <a:r>
-              <a:rPr lang="en-US" sz="2400" dirty="0" smtClean="0"/>
-              <a:t>profit </a:t>
-            </a:r>
-            <a:r>
-              <a:rPr lang="en-US" sz="2400" dirty="0" smtClean="0"/>
-              <a:t>off</a:t>
-            </a:r>
-            <a:r>
-              <a:rPr lang="en-US" sz="2400" dirty="0" smtClean="0"/>
-              <a:t> </a:t>
-            </a:r>
-            <a:r>
-              <a:rPr lang="en-US" sz="2400" dirty="0" smtClean="0"/>
-              <a:t>premium of </a:t>
-            </a:r>
-            <a:r>
-              <a:rPr lang="en-US" sz="2400" dirty="0" smtClean="0"/>
-              <a:t>insurance cross</a:t>
-            </a:r>
-            <a:r>
-              <a:rPr lang="en-US" sz="2400" dirty="0" smtClean="0"/>
-              <a:t>-sales.  </a:t>
+              <a:t> 15% profit off premium of insurance cross-sales.  </a:t>
             </a:r>
           </a:p>
           <a:p>
@@ -5074,15 +5042,7 @@
                   <a:srgbClr val="FFFF00"/>
                 </a:solidFill>
               </a:rPr>
-              <a:t>Crypto Wallet </a:t>
-            </a:r>
-            <a:r>
-              <a:rPr lang="en-US" b="1" dirty="0" smtClean="0">
-                <a:solidFill>
-                  <a:srgbClr val="FFFF00"/>
-                </a:solidFill>
-              </a:rPr>
-              <a:t>Referral </a:t>
+              <a:t>Crypto Wallet Referral </a:t>
             </a:r>
             <a:r>
               <a:rPr lang="en-US" b="1" dirty="0">
@@ -5184,20 +5144,16 @@
         </p:nvSpPr>
         <p:spPr/>
         <p:txBody>
-          <a:bodyPr/>
+          <a:bodyPr>
+            <a:normAutofit fontScale="90000"/>
+          </a:bodyPr>
           <a:lstStyle/>
           <a:p>
             <a:r>
               <a:rPr lang="en-US" u="sng" dirty="0" smtClean="0">
                 <a:latin typeface="Vermin Vibes 2"/>
               </a:rPr>
-              <a:t>Competition</a:t>
-            </a:r>
-            <a:r>
-              <a:rPr lang="en-US" u="sng" dirty="0" smtClean="0">
-                <a:latin typeface="Vermin Vibes 2"/>
-              </a:rPr>
-              <a:t>/Partners</a:t>
+              <a:t>COMPETITIVE LANDSCAPE</a:t>
             </a:r>
             <a:endParaRPr lang="en-US" u="sng" dirty="0">
               <a:latin typeface="Vermin Vibes 2"/>
@@ -5205,179 +5161,1120 @@
           </a:p>
         </p:txBody>
       </p:sp>
-      <p:sp>
-        <p:nvSpPr>
-          <p:cNvPr id="3" name="Content Placeholder 2"/>
-          <p:cNvSpPr>
-            <a:spLocks noGrp="1"/>
-          </p:cNvSpPr>
+      <p:graphicFrame>
+        <p:nvGraphicFramePr>
+          <p:cNvPr id="4" name="Content Placeholder 3"/>
+          <p:cNvGraphicFramePr>
+            <a:graphicFrameLocks noGrp="1"/>
+          </p:cNvGraphicFramePr>
           <p:nvPr>
             <p:ph idx="1"/>
-          </p:nvPr>
-        </p:nvSpPr>
-        <p:spPr>
-          <a:xfrm>
-            <a:off x="457200" y="1652648"/>
-            <a:ext cx="8229600" cy="4830567"/>
-          </a:xfrm>
-        </p:spPr>
-        <p:txBody>
-          <a:bodyPr>
-            <a:normAutofit/>
-          </a:bodyPr>
-          <a:lstStyle/>
-          <a:p>
-            <a:pPr marL="57150" indent="-457200"/>
-            <a:r>
-              <a:rPr lang="en-US" sz="2000" dirty="0" smtClean="0"/>
-              <a:t>Bike </a:t>
-            </a:r>
-            <a:r>
-              <a:rPr lang="en-US" sz="2000" dirty="0" smtClean="0"/>
-              <a:t>Index</a:t>
-            </a:r>
-            <a:endParaRPr lang="en-US" sz="2000" dirty="0" smtClean="0">
-              <a:hlinkClick r:id="rId2"/>
-            </a:endParaRPr>
-          </a:p>
-          <a:p>
-            <a:pPr marL="57150" indent="-457200"/>
-            <a:r>
-              <a:rPr lang="en-US" sz="2000" dirty="0" smtClean="0">
-                <a:solidFill>
-                  <a:srgbClr val="FFFFFF"/>
-                </a:solidFill>
-              </a:rPr>
-              <a:t>Bike Guard</a:t>
-            </a:r>
-          </a:p>
-          <a:p>
-            <a:pPr marL="57150" indent="-457200"/>
-            <a:r>
-              <a:rPr lang="en-US" sz="2000" dirty="0" smtClean="0">
-                <a:solidFill>
-                  <a:srgbClr val="FFFFFF"/>
-                </a:solidFill>
-              </a:rPr>
-              <a:t>National Bike Registry</a:t>
-            </a:r>
-          </a:p>
-          <a:p>
-            <a:pPr marL="57150" indent="-457200"/>
-            <a:r>
-              <a:rPr lang="en-US" sz="2000" dirty="0" smtClean="0">
-                <a:solidFill>
-                  <a:srgbClr val="FFFFFF"/>
-                </a:solidFill>
-              </a:rPr>
-              <a:t>Bike Registry (Global)</a:t>
-            </a:r>
-          </a:p>
-          <a:p>
-            <a:pPr marL="400050" lvl="1" indent="0">
-              <a:buNone/>
-            </a:pPr>
-            <a:endParaRPr lang="en-US" dirty="0">
-              <a:solidFill>
-                <a:srgbClr val="FFFFFF"/>
-              </a:solidFill>
-            </a:endParaRPr>
-          </a:p>
-          <a:p>
-            <a:pPr marL="400050" lvl="1" indent="0">
-              <a:buNone/>
-            </a:pPr>
-            <a:r>
-              <a:rPr lang="en-US" sz="2000" dirty="0" smtClean="0">
-                <a:solidFill>
-                  <a:srgbClr val="FFFF00"/>
-                </a:solidFill>
-              </a:rPr>
-              <a:t>Bike Index is the largest </a:t>
-            </a:r>
-            <a:r>
-              <a:rPr lang="en-US" sz="2000" dirty="0">
-                <a:solidFill>
-                  <a:srgbClr val="FFFF00"/>
-                </a:solidFill>
-              </a:rPr>
-              <a:t>competitor with </a:t>
-            </a:r>
-            <a:r>
-              <a:rPr lang="en-US" sz="2000" dirty="0" smtClean="0">
-                <a:solidFill>
-                  <a:srgbClr val="FFFF00"/>
-                </a:solidFill>
-              </a:rPr>
-              <a:t>over 186,000 </a:t>
-            </a:r>
-            <a:r>
-              <a:rPr lang="en-US" sz="2000" dirty="0">
-                <a:solidFill>
-                  <a:srgbClr val="FFFF00"/>
-                </a:solidFill>
-              </a:rPr>
-              <a:t>Registered </a:t>
-            </a:r>
-            <a:r>
-              <a:rPr lang="en-US" sz="2000" dirty="0" smtClean="0">
-                <a:solidFill>
-                  <a:srgbClr val="FFFF00"/>
-                </a:solidFill>
-              </a:rPr>
-              <a:t>Bikes. </a:t>
-            </a:r>
-            <a:r>
-              <a:rPr lang="en-US" sz="2000" dirty="0"/>
-              <a:t>A</a:t>
-            </a:r>
-            <a:r>
-              <a:rPr lang="en-US" sz="2000" dirty="0" smtClean="0"/>
-              <a:t>ll of these competitors have </a:t>
-            </a:r>
-            <a:r>
-              <a:rPr lang="en-US" sz="2000" dirty="0" smtClean="0">
-                <a:solidFill>
-                  <a:srgbClr val="FFFF00"/>
-                </a:solidFill>
-              </a:rPr>
-              <a:t>a fairly narrow and altruistic goal </a:t>
-            </a:r>
-            <a:r>
-              <a:rPr lang="en-US" sz="2000" dirty="0" smtClean="0"/>
-              <a:t>- to prevent theft and facilitate recovery of stolen bikes. While </a:t>
-            </a:r>
-            <a:r>
-              <a:rPr lang="en-US" sz="2000" dirty="0" err="1" smtClean="0"/>
-              <a:t>BikeDeed</a:t>
-            </a:r>
-            <a:r>
-              <a:rPr lang="en-US" sz="2000" dirty="0" smtClean="0"/>
-              <a:t> sees itself competing with these organizations for users, we ultimately see ourselves </a:t>
-            </a:r>
-            <a:r>
-              <a:rPr lang="en-US" sz="2000" dirty="0" smtClean="0">
-                <a:solidFill>
-                  <a:srgbClr val="FFFF00"/>
-                </a:solidFill>
-              </a:rPr>
-              <a:t>partnering with or even joining </a:t>
-            </a:r>
-            <a:r>
-              <a:rPr lang="en-US" sz="2000" dirty="0" smtClean="0"/>
-              <a:t>these organizations.  </a:t>
-            </a:r>
-            <a:r>
-              <a:rPr lang="en-US" sz="2000" dirty="0" err="1" smtClean="0"/>
-              <a:t>BikeDeed</a:t>
-            </a:r>
-            <a:r>
-              <a:rPr lang="en-US" sz="2000" dirty="0" smtClean="0"/>
-              <a:t> sees theft and recovery as only one piece of a much larger puzzle.    </a:t>
-            </a:r>
-          </a:p>
-        </p:txBody>
-      </p:sp>
+            <p:extLst>
+              <p:ext uri="{D42A27DB-BD31-4B8C-83A1-F6EECF244321}">
+                <p14:modId xmlns:p14="http://schemas.microsoft.com/office/powerpoint/2010/main" val="4091706570"/>
+              </p:ext>
+            </p:extLst>
+          </p:nvPr>
+        </p:nvGraphicFramePr>
+        <p:xfrm>
+          <a:off x="457200" y="1652588"/>
+          <a:ext cx="8229600" cy="4683760"/>
+        </p:xfrm>
+        <a:graphic>
+          <a:graphicData uri="http://schemas.openxmlformats.org/drawingml/2006/table">
+            <a:tbl>
+              <a:tblPr firstRow="1" bandRow="1">
+                <a:tableStyleId>{5C22544A-7EE6-4342-B048-85BDC9FD1C3A}</a:tableStyleId>
+              </a:tblPr>
+              <a:tblGrid>
+                <a:gridCol w="1645920"/>
+                <a:gridCol w="1645920"/>
+                <a:gridCol w="1645920"/>
+                <a:gridCol w="1645920"/>
+                <a:gridCol w="1645920"/>
+              </a:tblGrid>
+              <a:tr h="370840">
+                <a:tc>
+                  <a:txBody>
+                    <a:bodyPr/>
+                    <a:lstStyle/>
+                    <a:p>
+                      <a:endParaRPr lang="en-US" dirty="0"/>
+                    </a:p>
+                  </a:txBody>
+                  <a:tcPr/>
+                </a:tc>
+                <a:tc>
+                  <a:txBody>
+                    <a:bodyPr/>
+                    <a:lstStyle/>
+                    <a:p>
+                      <a:r>
+                        <a:rPr lang="en-US" dirty="0" smtClean="0"/>
+                        <a:t>Bike</a:t>
+                      </a:r>
+                      <a:r>
+                        <a:rPr lang="en-US" baseline="0" dirty="0" smtClean="0"/>
+                        <a:t> Index</a:t>
+                      </a:r>
+                      <a:endParaRPr lang="en-US" dirty="0"/>
+                    </a:p>
+                  </a:txBody>
+                  <a:tcPr/>
+                </a:tc>
+                <a:tc>
+                  <a:txBody>
+                    <a:bodyPr/>
+                    <a:lstStyle/>
+                    <a:p>
+                      <a:r>
+                        <a:rPr lang="en-US" dirty="0" smtClean="0"/>
+                        <a:t>Bike Guard</a:t>
+                      </a:r>
+                      <a:endParaRPr lang="en-US" dirty="0"/>
+                    </a:p>
+                  </a:txBody>
+                  <a:tcPr/>
+                </a:tc>
+                <a:tc>
+                  <a:txBody>
+                    <a:bodyPr/>
+                    <a:lstStyle/>
+                    <a:p>
+                      <a:r>
+                        <a:rPr lang="en-US" dirty="0" smtClean="0"/>
+                        <a:t>National Bike Registry</a:t>
+                      </a:r>
+                      <a:endParaRPr lang="en-US" dirty="0"/>
+                    </a:p>
+                  </a:txBody>
+                  <a:tcPr/>
+                </a:tc>
+                <a:tc>
+                  <a:txBody>
+                    <a:bodyPr/>
+                    <a:lstStyle/>
+                    <a:p>
+                      <a:r>
+                        <a:rPr lang="en-US" dirty="0" err="1" smtClean="0"/>
+                        <a:t>BikeDeed</a:t>
+                      </a:r>
+                      <a:endParaRPr lang="en-US" dirty="0"/>
+                    </a:p>
+                  </a:txBody>
+                  <a:tcPr/>
+                </a:tc>
+              </a:tr>
+              <a:tr h="370840">
+                <a:tc>
+                  <a:txBody>
+                    <a:bodyPr/>
+                    <a:lstStyle/>
+                    <a:p>
+                      <a:r>
+                        <a:rPr lang="en-US" dirty="0" smtClean="0"/>
+                        <a:t>Theft/Recovery</a:t>
+                      </a:r>
+                      <a:endParaRPr lang="en-US" dirty="0"/>
+                    </a:p>
+                  </a:txBody>
+                  <a:tcPr/>
+                </a:tc>
+                <a:tc>
+                  <a:txBody>
+                    <a:bodyPr/>
+                    <a:lstStyle/>
+                    <a:p>
+                      <a:r>
+                        <a:rPr lang="en-US" dirty="0" smtClean="0">
+                          <a:solidFill>
+                            <a:srgbClr val="008000"/>
+                          </a:solidFill>
+                          <a:latin typeface="Zapf Dingbats"/>
+                          <a:ea typeface="Zapf Dingbats"/>
+                          <a:cs typeface="Zapf Dingbats"/>
+                          <a:sym typeface="Zapf Dingbats"/>
+                        </a:rPr>
+                        <a:t>✔</a:t>
+                      </a:r>
+                      <a:endParaRPr lang="en-US" dirty="0">
+                        <a:solidFill>
+                          <a:srgbClr val="008000"/>
+                        </a:solidFill>
+                      </a:endParaRPr>
+                    </a:p>
+                  </a:txBody>
+                  <a:tcPr/>
+                </a:tc>
+                <a:tc>
+                  <a:txBody>
+                    <a:bodyPr/>
+                    <a:lstStyle/>
+                    <a:p>
+                      <a:r>
+                        <a:rPr lang="en-US" dirty="0" smtClean="0">
+                          <a:solidFill>
+                            <a:srgbClr val="008000"/>
+                          </a:solidFill>
+                          <a:latin typeface="Zapf Dingbats"/>
+                          <a:ea typeface="Zapf Dingbats"/>
+                          <a:cs typeface="Zapf Dingbats"/>
+                          <a:sym typeface="Zapf Dingbats"/>
+                        </a:rPr>
+                        <a:t>✔</a:t>
+                      </a:r>
+                      <a:endParaRPr lang="en-US" dirty="0">
+                        <a:solidFill>
+                          <a:srgbClr val="008000"/>
+                        </a:solidFill>
+                      </a:endParaRPr>
+                    </a:p>
+                  </a:txBody>
+                  <a:tcPr/>
+                </a:tc>
+                <a:tc>
+                  <a:txBody>
+                    <a:bodyPr/>
+                    <a:lstStyle/>
+                    <a:p>
+                      <a:r>
+                        <a:rPr lang="en-US" dirty="0" smtClean="0">
+                          <a:solidFill>
+                            <a:srgbClr val="008000"/>
+                          </a:solidFill>
+                          <a:latin typeface="Zapf Dingbats"/>
+                          <a:ea typeface="Zapf Dingbats"/>
+                          <a:cs typeface="Zapf Dingbats"/>
+                          <a:sym typeface="Zapf Dingbats"/>
+                        </a:rPr>
+                        <a:t>✔</a:t>
+                      </a:r>
+                      <a:endParaRPr lang="en-US" dirty="0">
+                        <a:solidFill>
+                          <a:srgbClr val="008000"/>
+                        </a:solidFill>
+                      </a:endParaRPr>
+                    </a:p>
+                  </a:txBody>
+                  <a:tcPr/>
+                </a:tc>
+                <a:tc>
+                  <a:txBody>
+                    <a:bodyPr/>
+                    <a:lstStyle/>
+                    <a:p>
+                      <a:r>
+                        <a:rPr lang="en-US" dirty="0" smtClean="0">
+                          <a:solidFill>
+                            <a:srgbClr val="008000"/>
+                          </a:solidFill>
+                          <a:latin typeface="Zapf Dingbats"/>
+                          <a:ea typeface="Zapf Dingbats"/>
+                          <a:cs typeface="Zapf Dingbats"/>
+                          <a:sym typeface="Zapf Dingbats"/>
+                        </a:rPr>
+                        <a:t>✔</a:t>
+                      </a:r>
+                      <a:endParaRPr lang="en-US" dirty="0">
+                        <a:solidFill>
+                          <a:srgbClr val="008000"/>
+                        </a:solidFill>
+                      </a:endParaRPr>
+                    </a:p>
+                  </a:txBody>
+                  <a:tcPr/>
+                </a:tc>
+              </a:tr>
+              <a:tr h="370840">
+                <a:tc>
+                  <a:txBody>
+                    <a:bodyPr/>
+                    <a:lstStyle/>
+                    <a:p>
+                      <a:r>
+                        <a:rPr lang="en-US" dirty="0" smtClean="0"/>
+                        <a:t>Proof of Ownership</a:t>
+                      </a:r>
+                      <a:endParaRPr lang="en-US" dirty="0"/>
+                    </a:p>
+                  </a:txBody>
+                  <a:tcPr/>
+                </a:tc>
+                <a:tc>
+                  <a:txBody>
+                    <a:bodyPr/>
+                    <a:lstStyle/>
+                    <a:p>
+                      <a:r>
+                        <a:rPr lang="en-US" dirty="0" smtClean="0">
+                          <a:solidFill>
+                            <a:srgbClr val="008000"/>
+                          </a:solidFill>
+                          <a:latin typeface="Zapf Dingbats"/>
+                          <a:ea typeface="Zapf Dingbats"/>
+                          <a:cs typeface="Zapf Dingbats"/>
+                          <a:sym typeface="Zapf Dingbats"/>
+                        </a:rPr>
+                        <a:t>✔</a:t>
+                      </a:r>
+                      <a:endParaRPr lang="en-US" dirty="0">
+                        <a:solidFill>
+                          <a:srgbClr val="008000"/>
+                        </a:solidFill>
+                      </a:endParaRPr>
+                    </a:p>
+                  </a:txBody>
+                  <a:tcPr/>
+                </a:tc>
+                <a:tc>
+                  <a:txBody>
+                    <a:bodyPr/>
+                    <a:lstStyle/>
+                    <a:p>
+                      <a:r>
+                        <a:rPr lang="en-US" dirty="0" smtClean="0">
+                          <a:solidFill>
+                            <a:srgbClr val="008000"/>
+                          </a:solidFill>
+                          <a:latin typeface="Zapf Dingbats"/>
+                          <a:ea typeface="Zapf Dingbats"/>
+                          <a:cs typeface="Zapf Dingbats"/>
+                          <a:sym typeface="Zapf Dingbats"/>
+                        </a:rPr>
+                        <a:t>✔</a:t>
+                      </a:r>
+                      <a:endParaRPr lang="en-US" dirty="0">
+                        <a:solidFill>
+                          <a:srgbClr val="008000"/>
+                        </a:solidFill>
+                      </a:endParaRPr>
+                    </a:p>
+                  </a:txBody>
+                  <a:tcPr/>
+                </a:tc>
+                <a:tc>
+                  <a:txBody>
+                    <a:bodyPr/>
+                    <a:lstStyle/>
+                    <a:p>
+                      <a:r>
+                        <a:rPr lang="en-US" dirty="0" smtClean="0">
+                          <a:solidFill>
+                            <a:srgbClr val="008000"/>
+                          </a:solidFill>
+                          <a:latin typeface="Zapf Dingbats"/>
+                          <a:ea typeface="Zapf Dingbats"/>
+                          <a:cs typeface="Zapf Dingbats"/>
+                          <a:sym typeface="Zapf Dingbats"/>
+                        </a:rPr>
+                        <a:t>✔</a:t>
+                      </a:r>
+                      <a:endParaRPr lang="en-US" dirty="0">
+                        <a:solidFill>
+                          <a:srgbClr val="008000"/>
+                        </a:solidFill>
+                      </a:endParaRPr>
+                    </a:p>
+                  </a:txBody>
+                  <a:tcPr/>
+                </a:tc>
+                <a:tc>
+                  <a:txBody>
+                    <a:bodyPr/>
+                    <a:lstStyle/>
+                    <a:p>
+                      <a:r>
+                        <a:rPr lang="en-US" dirty="0" smtClean="0">
+                          <a:solidFill>
+                            <a:srgbClr val="008000"/>
+                          </a:solidFill>
+                          <a:latin typeface="Zapf Dingbats"/>
+                          <a:ea typeface="Zapf Dingbats"/>
+                          <a:cs typeface="Zapf Dingbats"/>
+                          <a:sym typeface="Zapf Dingbats"/>
+                        </a:rPr>
+                        <a:t>✔</a:t>
+                      </a:r>
+                      <a:endParaRPr lang="en-US" dirty="0">
+                        <a:solidFill>
+                          <a:srgbClr val="008000"/>
+                        </a:solidFill>
+                      </a:endParaRPr>
+                    </a:p>
+                  </a:txBody>
+                  <a:tcPr/>
+                </a:tc>
+              </a:tr>
+              <a:tr h="370840">
+                <a:tc>
+                  <a:txBody>
+                    <a:bodyPr/>
+                    <a:lstStyle/>
+                    <a:p>
+                      <a:r>
+                        <a:rPr lang="en-US" dirty="0" smtClean="0"/>
+                        <a:t>Transfer of Ownership</a:t>
+                      </a:r>
+                      <a:endParaRPr lang="en-US" dirty="0"/>
+                    </a:p>
+                  </a:txBody>
+                  <a:tcPr/>
+                </a:tc>
+                <a:tc>
+                  <a:txBody>
+                    <a:bodyPr/>
+                    <a:lstStyle/>
+                    <a:p>
+                      <a:r>
+                        <a:rPr lang="en-US" dirty="0" smtClean="0">
+                          <a:solidFill>
+                            <a:srgbClr val="FF0000"/>
+                          </a:solidFill>
+                          <a:latin typeface="Zapf Dingbats"/>
+                          <a:ea typeface="Zapf Dingbats"/>
+                          <a:cs typeface="Zapf Dingbats"/>
+                          <a:sym typeface="Zapf Dingbats"/>
+                        </a:rPr>
+                        <a:t>✖</a:t>
+                      </a:r>
+                      <a:endParaRPr lang="en-US" dirty="0">
+                        <a:solidFill>
+                          <a:srgbClr val="FF0000"/>
+                        </a:solidFill>
+                      </a:endParaRPr>
+                    </a:p>
+                  </a:txBody>
+                  <a:tcPr/>
+                </a:tc>
+                <a:tc>
+                  <a:txBody>
+                    <a:bodyPr/>
+                    <a:lstStyle/>
+                    <a:p>
+                      <a:r>
+                        <a:rPr lang="en-US" dirty="0" smtClean="0">
+                          <a:solidFill>
+                            <a:srgbClr val="FF0000"/>
+                          </a:solidFill>
+                          <a:latin typeface="Zapf Dingbats"/>
+                          <a:ea typeface="Zapf Dingbats"/>
+                          <a:cs typeface="Zapf Dingbats"/>
+                          <a:sym typeface="Zapf Dingbats"/>
+                        </a:rPr>
+                        <a:t>✖</a:t>
+                      </a:r>
+                      <a:endParaRPr lang="en-US" dirty="0">
+                        <a:solidFill>
+                          <a:srgbClr val="FF0000"/>
+                        </a:solidFill>
+                      </a:endParaRPr>
+                    </a:p>
+                  </a:txBody>
+                  <a:tcPr/>
+                </a:tc>
+                <a:tc>
+                  <a:txBody>
+                    <a:bodyPr/>
+                    <a:lstStyle/>
+                    <a:p>
+                      <a:r>
+                        <a:rPr lang="en-US" dirty="0" smtClean="0">
+                          <a:solidFill>
+                            <a:srgbClr val="FF0000"/>
+                          </a:solidFill>
+                          <a:latin typeface="Zapf Dingbats"/>
+                          <a:ea typeface="Zapf Dingbats"/>
+                          <a:cs typeface="Zapf Dingbats"/>
+                          <a:sym typeface="Zapf Dingbats"/>
+                        </a:rPr>
+                        <a:t>✖</a:t>
+                      </a:r>
+                      <a:endParaRPr lang="en-US" dirty="0">
+                        <a:solidFill>
+                          <a:srgbClr val="FF0000"/>
+                        </a:solidFill>
+                      </a:endParaRPr>
+                    </a:p>
+                  </a:txBody>
+                  <a:tcPr/>
+                </a:tc>
+                <a:tc>
+                  <a:txBody>
+                    <a:bodyPr/>
+                    <a:lstStyle/>
+                    <a:p>
+                      <a:r>
+                        <a:rPr lang="en-US" dirty="0" smtClean="0">
+                          <a:solidFill>
+                            <a:srgbClr val="008000"/>
+                          </a:solidFill>
+                          <a:latin typeface="Zapf Dingbats"/>
+                          <a:ea typeface="Zapf Dingbats"/>
+                          <a:cs typeface="Zapf Dingbats"/>
+                          <a:sym typeface="Zapf Dingbats"/>
+                        </a:rPr>
+                        <a:t>✔</a:t>
+                      </a:r>
+                      <a:endParaRPr lang="en-US" dirty="0">
+                        <a:solidFill>
+                          <a:srgbClr val="008000"/>
+                        </a:solidFill>
+                      </a:endParaRPr>
+                    </a:p>
+                  </a:txBody>
+                  <a:tcPr/>
+                </a:tc>
+              </a:tr>
+              <a:tr h="370840">
+                <a:tc>
+                  <a:txBody>
+                    <a:bodyPr/>
+                    <a:lstStyle/>
+                    <a:p>
+                      <a:r>
+                        <a:rPr lang="en-US" dirty="0" smtClean="0"/>
+                        <a:t>Maintenance</a:t>
+                      </a:r>
+                      <a:r>
+                        <a:rPr lang="en-US" baseline="0" dirty="0" smtClean="0"/>
+                        <a:t> Records</a:t>
+                      </a:r>
+                      <a:endParaRPr lang="en-US" dirty="0"/>
+                    </a:p>
+                  </a:txBody>
+                  <a:tcPr/>
+                </a:tc>
+                <a:tc>
+                  <a:txBody>
+                    <a:bodyPr/>
+                    <a:lstStyle/>
+                    <a:p>
+                      <a:r>
+                        <a:rPr lang="en-US" dirty="0" smtClean="0">
+                          <a:solidFill>
+                            <a:srgbClr val="FF0000"/>
+                          </a:solidFill>
+                          <a:latin typeface="Zapf Dingbats"/>
+                          <a:ea typeface="Zapf Dingbats"/>
+                          <a:cs typeface="Zapf Dingbats"/>
+                          <a:sym typeface="Zapf Dingbats"/>
+                        </a:rPr>
+                        <a:t>✖</a:t>
+                      </a:r>
+                      <a:endParaRPr lang="en-US" dirty="0">
+                        <a:solidFill>
+                          <a:srgbClr val="FF0000"/>
+                        </a:solidFill>
+                      </a:endParaRPr>
+                    </a:p>
+                  </a:txBody>
+                  <a:tcPr/>
+                </a:tc>
+                <a:tc>
+                  <a:txBody>
+                    <a:bodyPr/>
+                    <a:lstStyle/>
+                    <a:p>
+                      <a:r>
+                        <a:rPr lang="en-US" dirty="0" smtClean="0">
+                          <a:solidFill>
+                            <a:srgbClr val="FF0000"/>
+                          </a:solidFill>
+                          <a:latin typeface="Zapf Dingbats"/>
+                          <a:ea typeface="Zapf Dingbats"/>
+                          <a:cs typeface="Zapf Dingbats"/>
+                          <a:sym typeface="Zapf Dingbats"/>
+                        </a:rPr>
+                        <a:t>✖</a:t>
+                      </a:r>
+                      <a:endParaRPr lang="en-US" dirty="0">
+                        <a:solidFill>
+                          <a:srgbClr val="FF0000"/>
+                        </a:solidFill>
+                      </a:endParaRPr>
+                    </a:p>
+                  </a:txBody>
+                  <a:tcPr/>
+                </a:tc>
+                <a:tc>
+                  <a:txBody>
+                    <a:bodyPr/>
+                    <a:lstStyle/>
+                    <a:p>
+                      <a:r>
+                        <a:rPr lang="en-US" dirty="0" smtClean="0">
+                          <a:solidFill>
+                            <a:srgbClr val="FF0000"/>
+                          </a:solidFill>
+                          <a:latin typeface="Zapf Dingbats"/>
+                          <a:ea typeface="Zapf Dingbats"/>
+                          <a:cs typeface="Zapf Dingbats"/>
+                          <a:sym typeface="Zapf Dingbats"/>
+                        </a:rPr>
+                        <a:t>✖</a:t>
+                      </a:r>
+                      <a:endParaRPr lang="en-US" dirty="0">
+                        <a:solidFill>
+                          <a:srgbClr val="FF0000"/>
+                        </a:solidFill>
+                      </a:endParaRPr>
+                    </a:p>
+                  </a:txBody>
+                  <a:tcPr/>
+                </a:tc>
+                <a:tc>
+                  <a:txBody>
+                    <a:bodyPr/>
+                    <a:lstStyle/>
+                    <a:p>
+                      <a:r>
+                        <a:rPr lang="en-US" dirty="0" smtClean="0">
+                          <a:solidFill>
+                            <a:srgbClr val="008000"/>
+                          </a:solidFill>
+                          <a:latin typeface="Zapf Dingbats"/>
+                          <a:ea typeface="Zapf Dingbats"/>
+                          <a:cs typeface="Zapf Dingbats"/>
+                          <a:sym typeface="Zapf Dingbats"/>
+                        </a:rPr>
+                        <a:t>✔</a:t>
+                      </a:r>
+                      <a:endParaRPr lang="en-US" dirty="0">
+                        <a:solidFill>
+                          <a:srgbClr val="008000"/>
+                        </a:solidFill>
+                      </a:endParaRPr>
+                    </a:p>
+                  </a:txBody>
+                  <a:tcPr/>
+                </a:tc>
+              </a:tr>
+              <a:tr h="370840">
+                <a:tc>
+                  <a:txBody>
+                    <a:bodyPr/>
+                    <a:lstStyle/>
+                    <a:p>
+                      <a:r>
+                        <a:rPr lang="en-US" dirty="0" smtClean="0"/>
+                        <a:t>Supply</a:t>
+                      </a:r>
+                      <a:r>
+                        <a:rPr lang="en-US" baseline="0" dirty="0" smtClean="0"/>
+                        <a:t> Chain</a:t>
+                      </a:r>
+                      <a:endParaRPr lang="en-US" dirty="0"/>
+                    </a:p>
+                  </a:txBody>
+                  <a:tcPr/>
+                </a:tc>
+                <a:tc>
+                  <a:txBody>
+                    <a:bodyPr/>
+                    <a:lstStyle/>
+                    <a:p>
+                      <a:r>
+                        <a:rPr lang="en-US" dirty="0" smtClean="0">
+                          <a:solidFill>
+                            <a:srgbClr val="FF0000"/>
+                          </a:solidFill>
+                          <a:latin typeface="Zapf Dingbats"/>
+                          <a:ea typeface="Zapf Dingbats"/>
+                          <a:cs typeface="Zapf Dingbats"/>
+                          <a:sym typeface="Zapf Dingbats"/>
+                        </a:rPr>
+                        <a:t>✖</a:t>
+                      </a:r>
+                      <a:endParaRPr lang="en-US" dirty="0">
+                        <a:solidFill>
+                          <a:srgbClr val="FF0000"/>
+                        </a:solidFill>
+                      </a:endParaRPr>
+                    </a:p>
+                  </a:txBody>
+                  <a:tcPr/>
+                </a:tc>
+                <a:tc>
+                  <a:txBody>
+                    <a:bodyPr/>
+                    <a:lstStyle/>
+                    <a:p>
+                      <a:r>
+                        <a:rPr lang="en-US" dirty="0" smtClean="0">
+                          <a:solidFill>
+                            <a:srgbClr val="FF0000"/>
+                          </a:solidFill>
+                          <a:latin typeface="Zapf Dingbats"/>
+                          <a:ea typeface="Zapf Dingbats"/>
+                          <a:cs typeface="Zapf Dingbats"/>
+                          <a:sym typeface="Zapf Dingbats"/>
+                        </a:rPr>
+                        <a:t>✖</a:t>
+                      </a:r>
+                      <a:endParaRPr lang="en-US" dirty="0">
+                        <a:solidFill>
+                          <a:srgbClr val="FF0000"/>
+                        </a:solidFill>
+                      </a:endParaRPr>
+                    </a:p>
+                  </a:txBody>
+                  <a:tcPr/>
+                </a:tc>
+                <a:tc>
+                  <a:txBody>
+                    <a:bodyPr/>
+                    <a:lstStyle/>
+                    <a:p>
+                      <a:r>
+                        <a:rPr lang="en-US" dirty="0" smtClean="0">
+                          <a:solidFill>
+                            <a:srgbClr val="FF0000"/>
+                          </a:solidFill>
+                          <a:latin typeface="Zapf Dingbats"/>
+                          <a:ea typeface="Zapf Dingbats"/>
+                          <a:cs typeface="Zapf Dingbats"/>
+                          <a:sym typeface="Zapf Dingbats"/>
+                        </a:rPr>
+                        <a:t>✖</a:t>
+                      </a:r>
+                      <a:endParaRPr lang="en-US" dirty="0">
+                        <a:solidFill>
+                          <a:srgbClr val="FF0000"/>
+                        </a:solidFill>
+                      </a:endParaRPr>
+                    </a:p>
+                  </a:txBody>
+                  <a:tcPr/>
+                </a:tc>
+                <a:tc>
+                  <a:txBody>
+                    <a:bodyPr/>
+                    <a:lstStyle/>
+                    <a:p>
+                      <a:r>
+                        <a:rPr lang="en-US" dirty="0" smtClean="0">
+                          <a:solidFill>
+                            <a:srgbClr val="008000"/>
+                          </a:solidFill>
+                          <a:latin typeface="Zapf Dingbats"/>
+                          <a:ea typeface="Zapf Dingbats"/>
+                          <a:cs typeface="Zapf Dingbats"/>
+                          <a:sym typeface="Zapf Dingbats"/>
+                        </a:rPr>
+                        <a:t>✔</a:t>
+                      </a:r>
+                      <a:endParaRPr lang="en-US" dirty="0">
+                        <a:solidFill>
+                          <a:srgbClr val="008000"/>
+                        </a:solidFill>
+                      </a:endParaRPr>
+                    </a:p>
+                  </a:txBody>
+                  <a:tcPr/>
+                </a:tc>
+              </a:tr>
+              <a:tr h="370840">
+                <a:tc>
+                  <a:txBody>
+                    <a:bodyPr/>
+                    <a:lstStyle/>
+                    <a:p>
+                      <a:r>
+                        <a:rPr lang="en-US" dirty="0" smtClean="0"/>
+                        <a:t>Proof of Value</a:t>
+                      </a:r>
+                      <a:endParaRPr lang="en-US" dirty="0"/>
+                    </a:p>
+                  </a:txBody>
+                  <a:tcPr/>
+                </a:tc>
+                <a:tc>
+                  <a:txBody>
+                    <a:bodyPr/>
+                    <a:lstStyle/>
+                    <a:p>
+                      <a:r>
+                        <a:rPr lang="en-US" dirty="0" smtClean="0">
+                          <a:solidFill>
+                            <a:srgbClr val="FF0000"/>
+                          </a:solidFill>
+                          <a:latin typeface="Zapf Dingbats"/>
+                          <a:ea typeface="Zapf Dingbats"/>
+                          <a:cs typeface="Zapf Dingbats"/>
+                          <a:sym typeface="Zapf Dingbats"/>
+                        </a:rPr>
+                        <a:t>✖</a:t>
+                      </a:r>
+                      <a:endParaRPr lang="en-US" dirty="0">
+                        <a:solidFill>
+                          <a:srgbClr val="FF0000"/>
+                        </a:solidFill>
+                      </a:endParaRPr>
+                    </a:p>
+                  </a:txBody>
+                  <a:tcPr/>
+                </a:tc>
+                <a:tc>
+                  <a:txBody>
+                    <a:bodyPr/>
+                    <a:lstStyle/>
+                    <a:p>
+                      <a:pPr marL="0" marR="0" indent="0" algn="l" defTabSz="914400" rtl="0" eaLnBrk="1" fontAlgn="auto" latinLnBrk="0" hangingPunct="1">
+                        <a:lnSpc>
+                          <a:spcPct val="100000"/>
+                        </a:lnSpc>
+                        <a:spcBef>
+                          <a:spcPts val="0"/>
+                        </a:spcBef>
+                        <a:spcAft>
+                          <a:spcPts val="0"/>
+                        </a:spcAft>
+                        <a:buClrTx/>
+                        <a:buSzTx/>
+                        <a:buFontTx/>
+                        <a:buNone/>
+                        <a:tabLst/>
+                        <a:defRPr/>
+                      </a:pPr>
+                      <a:r>
+                        <a:rPr lang="en-US" dirty="0" smtClean="0">
+                          <a:solidFill>
+                            <a:srgbClr val="FF0000"/>
+                          </a:solidFill>
+                          <a:latin typeface="Zapf Dingbats"/>
+                          <a:ea typeface="Zapf Dingbats"/>
+                          <a:cs typeface="Zapf Dingbats"/>
+                          <a:sym typeface="Zapf Dingbats"/>
+                        </a:rPr>
+                        <a:t>✖</a:t>
+                      </a:r>
+                      <a:endParaRPr lang="en-US" dirty="0" smtClean="0">
+                        <a:solidFill>
+                          <a:srgbClr val="FF0000"/>
+                        </a:solidFill>
+                      </a:endParaRPr>
+                    </a:p>
+                  </a:txBody>
+                  <a:tcPr/>
+                </a:tc>
+                <a:tc>
+                  <a:txBody>
+                    <a:bodyPr/>
+                    <a:lstStyle/>
+                    <a:p>
+                      <a:pPr marL="0" marR="0" indent="0" algn="l" defTabSz="914400" rtl="0" eaLnBrk="1" fontAlgn="auto" latinLnBrk="0" hangingPunct="1">
+                        <a:lnSpc>
+                          <a:spcPct val="100000"/>
+                        </a:lnSpc>
+                        <a:spcBef>
+                          <a:spcPts val="0"/>
+                        </a:spcBef>
+                        <a:spcAft>
+                          <a:spcPts val="0"/>
+                        </a:spcAft>
+                        <a:buClrTx/>
+                        <a:buSzTx/>
+                        <a:buFontTx/>
+                        <a:buNone/>
+                        <a:tabLst/>
+                        <a:defRPr/>
+                      </a:pPr>
+                      <a:r>
+                        <a:rPr lang="en-US" dirty="0" smtClean="0">
+                          <a:solidFill>
+                            <a:srgbClr val="FF0000"/>
+                          </a:solidFill>
+                          <a:latin typeface="Zapf Dingbats"/>
+                          <a:ea typeface="Zapf Dingbats"/>
+                          <a:cs typeface="Zapf Dingbats"/>
+                          <a:sym typeface="Zapf Dingbats"/>
+                        </a:rPr>
+                        <a:t>✖</a:t>
+                      </a:r>
+                      <a:endParaRPr lang="en-US" dirty="0" smtClean="0">
+                        <a:solidFill>
+                          <a:srgbClr val="FF0000"/>
+                        </a:solidFill>
+                      </a:endParaRPr>
+                    </a:p>
+                  </a:txBody>
+                  <a:tcPr/>
+                </a:tc>
+                <a:tc>
+                  <a:txBody>
+                    <a:bodyPr/>
+                    <a:lstStyle/>
+                    <a:p>
+                      <a:r>
+                        <a:rPr lang="en-US" dirty="0" smtClean="0">
+                          <a:solidFill>
+                            <a:srgbClr val="008000"/>
+                          </a:solidFill>
+                          <a:latin typeface="Zapf Dingbats"/>
+                          <a:ea typeface="Zapf Dingbats"/>
+                          <a:cs typeface="Zapf Dingbats"/>
+                          <a:sym typeface="Zapf Dingbats"/>
+                        </a:rPr>
+                        <a:t>✔</a:t>
+                      </a:r>
+                      <a:endParaRPr lang="en-US" dirty="0">
+                        <a:solidFill>
+                          <a:srgbClr val="008000"/>
+                        </a:solidFill>
+                      </a:endParaRPr>
+                    </a:p>
+                  </a:txBody>
+                  <a:tcPr/>
+                </a:tc>
+              </a:tr>
+              <a:tr h="370840">
+                <a:tc>
+                  <a:txBody>
+                    <a:bodyPr/>
+                    <a:lstStyle/>
+                    <a:p>
+                      <a:r>
+                        <a:rPr lang="en-US" dirty="0" smtClean="0"/>
+                        <a:t>Internationally</a:t>
+                      </a:r>
+                      <a:r>
+                        <a:rPr lang="en-US" baseline="0" dirty="0" smtClean="0"/>
+                        <a:t> Focused</a:t>
+                      </a:r>
+                      <a:endParaRPr lang="en-US" dirty="0"/>
+                    </a:p>
+                  </a:txBody>
+                  <a:tcPr/>
+                </a:tc>
+                <a:tc>
+                  <a:txBody>
+                    <a:bodyPr/>
+                    <a:lstStyle/>
+                    <a:p>
+                      <a:r>
+                        <a:rPr lang="en-US" dirty="0" smtClean="0">
+                          <a:solidFill>
+                            <a:srgbClr val="FF0000"/>
+                          </a:solidFill>
+                          <a:latin typeface="Zapf Dingbats"/>
+                          <a:ea typeface="Zapf Dingbats"/>
+                          <a:cs typeface="Zapf Dingbats"/>
+                          <a:sym typeface="Zapf Dingbats"/>
+                        </a:rPr>
+                        <a:t>✖</a:t>
+                      </a:r>
+                      <a:endParaRPr lang="en-US" dirty="0">
+                        <a:solidFill>
+                          <a:srgbClr val="FF0000"/>
+                        </a:solidFill>
+                      </a:endParaRPr>
+                    </a:p>
+                  </a:txBody>
+                  <a:tcPr/>
+                </a:tc>
+                <a:tc>
+                  <a:txBody>
+                    <a:bodyPr/>
+                    <a:lstStyle/>
+                    <a:p>
+                      <a:r>
+                        <a:rPr lang="en-US" dirty="0" smtClean="0">
+                          <a:solidFill>
+                            <a:srgbClr val="FF0000"/>
+                          </a:solidFill>
+                          <a:latin typeface="Zapf Dingbats"/>
+                          <a:ea typeface="Zapf Dingbats"/>
+                          <a:cs typeface="Zapf Dingbats"/>
+                          <a:sym typeface="Zapf Dingbats"/>
+                        </a:rPr>
+                        <a:t>✖</a:t>
+                      </a:r>
+                      <a:endParaRPr lang="en-US" dirty="0">
+                        <a:solidFill>
+                          <a:srgbClr val="FF0000"/>
+                        </a:solidFill>
+                      </a:endParaRPr>
+                    </a:p>
+                  </a:txBody>
+                  <a:tcPr/>
+                </a:tc>
+                <a:tc>
+                  <a:txBody>
+                    <a:bodyPr/>
+                    <a:lstStyle/>
+                    <a:p>
+                      <a:r>
+                        <a:rPr lang="en-US" dirty="0" smtClean="0">
+                          <a:solidFill>
+                            <a:srgbClr val="008000"/>
+                          </a:solidFill>
+                          <a:latin typeface="Zapf Dingbats"/>
+                          <a:ea typeface="Zapf Dingbats"/>
+                          <a:cs typeface="Zapf Dingbats"/>
+                          <a:sym typeface="Zapf Dingbats"/>
+                        </a:rPr>
+                        <a:t>✔</a:t>
+                      </a:r>
+                      <a:endParaRPr lang="en-US" dirty="0">
+                        <a:solidFill>
+                          <a:srgbClr val="008000"/>
+                        </a:solidFill>
+                      </a:endParaRPr>
+                    </a:p>
+                  </a:txBody>
+                  <a:tcPr/>
+                </a:tc>
+                <a:tc>
+                  <a:txBody>
+                    <a:bodyPr/>
+                    <a:lstStyle/>
+                    <a:p>
+                      <a:r>
+                        <a:rPr lang="en-US" dirty="0" smtClean="0">
+                          <a:solidFill>
+                            <a:srgbClr val="008000"/>
+                          </a:solidFill>
+                          <a:latin typeface="Zapf Dingbats"/>
+                          <a:ea typeface="Zapf Dingbats"/>
+                          <a:cs typeface="Zapf Dingbats"/>
+                          <a:sym typeface="Zapf Dingbats"/>
+                        </a:rPr>
+                        <a:t>✔</a:t>
+                      </a:r>
+                      <a:endParaRPr lang="en-US" dirty="0">
+                        <a:solidFill>
+                          <a:srgbClr val="008000"/>
+                        </a:solidFill>
+                      </a:endParaRPr>
+                    </a:p>
+                  </a:txBody>
+                  <a:tcPr/>
+                </a:tc>
+              </a:tr>
+              <a:tr h="370840">
+                <a:tc>
+                  <a:txBody>
+                    <a:bodyPr/>
+                    <a:lstStyle/>
+                    <a:p>
+                      <a:r>
+                        <a:rPr lang="en-US" dirty="0" smtClean="0"/>
+                        <a:t>Decentralized</a:t>
+                      </a:r>
+                      <a:endParaRPr lang="en-US" dirty="0"/>
+                    </a:p>
+                  </a:txBody>
+                  <a:tcPr/>
+                </a:tc>
+                <a:tc>
+                  <a:txBody>
+                    <a:bodyPr/>
+                    <a:lstStyle/>
+                    <a:p>
+                      <a:r>
+                        <a:rPr lang="en-US" dirty="0" smtClean="0">
+                          <a:solidFill>
+                            <a:srgbClr val="FF0000"/>
+                          </a:solidFill>
+                          <a:latin typeface="Zapf Dingbats"/>
+                          <a:ea typeface="Zapf Dingbats"/>
+                          <a:cs typeface="Zapf Dingbats"/>
+                          <a:sym typeface="Zapf Dingbats"/>
+                        </a:rPr>
+                        <a:t>✖</a:t>
+                      </a:r>
+                      <a:endParaRPr lang="en-US" dirty="0">
+                        <a:solidFill>
+                          <a:srgbClr val="FF0000"/>
+                        </a:solidFill>
+                      </a:endParaRPr>
+                    </a:p>
+                  </a:txBody>
+                  <a:tcPr/>
+                </a:tc>
+                <a:tc>
+                  <a:txBody>
+                    <a:bodyPr/>
+                    <a:lstStyle/>
+                    <a:p>
+                      <a:r>
+                        <a:rPr lang="en-US" dirty="0" smtClean="0">
+                          <a:solidFill>
+                            <a:srgbClr val="FF0000"/>
+                          </a:solidFill>
+                          <a:latin typeface="Zapf Dingbats"/>
+                          <a:ea typeface="Zapf Dingbats"/>
+                          <a:cs typeface="Zapf Dingbats"/>
+                          <a:sym typeface="Zapf Dingbats"/>
+                        </a:rPr>
+                        <a:t>✖</a:t>
+                      </a:r>
+                      <a:endParaRPr lang="en-US" dirty="0">
+                        <a:solidFill>
+                          <a:srgbClr val="FF0000"/>
+                        </a:solidFill>
+                      </a:endParaRPr>
+                    </a:p>
+                  </a:txBody>
+                  <a:tcPr/>
+                </a:tc>
+                <a:tc>
+                  <a:txBody>
+                    <a:bodyPr/>
+                    <a:lstStyle/>
+                    <a:p>
+                      <a:r>
+                        <a:rPr lang="en-US" dirty="0" smtClean="0">
+                          <a:solidFill>
+                            <a:srgbClr val="FF0000"/>
+                          </a:solidFill>
+                          <a:latin typeface="Zapf Dingbats"/>
+                          <a:ea typeface="Zapf Dingbats"/>
+                          <a:cs typeface="Zapf Dingbats"/>
+                          <a:sym typeface="Zapf Dingbats"/>
+                        </a:rPr>
+                        <a:t>✖</a:t>
+                      </a:r>
+                      <a:endParaRPr lang="en-US" dirty="0">
+                        <a:solidFill>
+                          <a:srgbClr val="FF0000"/>
+                        </a:solidFill>
+                      </a:endParaRPr>
+                    </a:p>
+                  </a:txBody>
+                  <a:tcPr/>
+                </a:tc>
+                <a:tc>
+                  <a:txBody>
+                    <a:bodyPr/>
+                    <a:lstStyle/>
+                    <a:p>
+                      <a:r>
+                        <a:rPr lang="en-US" dirty="0" smtClean="0">
+                          <a:solidFill>
+                            <a:srgbClr val="008000"/>
+                          </a:solidFill>
+                          <a:latin typeface="Zapf Dingbats"/>
+                          <a:ea typeface="Zapf Dingbats"/>
+                          <a:cs typeface="Zapf Dingbats"/>
+                          <a:sym typeface="Zapf Dingbats"/>
+                        </a:rPr>
+                        <a:t>✔</a:t>
+                      </a:r>
+                      <a:endParaRPr lang="en-US" dirty="0">
+                        <a:solidFill>
+                          <a:srgbClr val="008000"/>
+                        </a:solidFill>
+                      </a:endParaRPr>
+                    </a:p>
+                  </a:txBody>
+                  <a:tcPr/>
+                </a:tc>
+              </a:tr>
+            </a:tbl>
+          </a:graphicData>
+        </a:graphic>
+      </p:graphicFrame>
     </p:spTree>
     <p:extLst>
       <p:ext uri="{BB962C8B-B14F-4D97-AF65-F5344CB8AC3E}">
@@ -5587,8 +6484,13 @@
             </a:pPr>
             <a:r>
               <a:rPr lang="en-US" sz="2400" dirty="0"/>
-              <a:t>Proof of Ownership</a:t>
-            </a:r>
+              <a:t>Theft and Recovery</a:t>
+            </a:r>
+            <a:r>
+              <a:rPr lang="en-US" sz="2400" dirty="0" smtClean="0"/>
+              <a:t>.</a:t>
+            </a:r>
+            <a:endParaRPr lang="en-US" sz="2400" dirty="0" smtClean="0"/>
           </a:p>
           <a:p>
             <a:pPr marL="342900" indent="-342900">
@@ -5597,16 +6499,17 @@
             </a:pPr>
             <a:r>
               <a:rPr lang="en-US" sz="2400" dirty="0" smtClean="0"/>
-              <a:t>Transfer of </a:t>
+              <a:t>Proof </a:t>
             </a:r>
             <a:r>
               <a:rPr lang="en-US" sz="2400" dirty="0"/>
-              <a:t>Ownership</a:t>
+              <a:t>of </a:t>
             </a:r>
             <a:r>
               <a:rPr lang="en-US" sz="2400" dirty="0" smtClean="0"/>
-              <a:t>.</a:t>
-            </a:r>
+              <a:t>Ownership.</a:t>
+            </a:r>
+            <a:endParaRPr lang="en-US" sz="2400" dirty="0"/>
           </a:p>
           <a:p>
             <a:pPr marL="342900" indent="-342900">
@@ -5614,12 +6517,16 @@
               <a:buChar char="•"/>
             </a:pPr>
             <a:r>
+              <a:rPr lang="en-US" sz="2400" dirty="0" smtClean="0"/>
+              <a:t>Transfer of </a:t>
+            </a:r>
+            <a:r>
               <a:rPr lang="en-US" sz="2400" dirty="0"/>
-              <a:t>Theft and </a:t>
+              <a:t>Ownership</a:t>
             </a:r>
             <a:r>
               <a:rPr lang="en-US" sz="2400" dirty="0" smtClean="0"/>
-              <a:t>Recovery.</a:t>
+              <a:t>.</a:t>
             </a:r>
             <a:endParaRPr lang="en-US" sz="2400" dirty="0" smtClean="0"/>
           </a:p>
@@ -5661,13 +6568,16 @@
             </a:pPr>
             <a:r>
               <a:rPr lang="en-US" sz="2400" dirty="0" smtClean="0"/>
-              <a:t> </a:t>
+              <a:t> Bike </a:t>
             </a:r>
             <a:r>
               <a:rPr lang="en-US" sz="2400" dirty="0" smtClean="0"/>
-              <a:t>Theft and Recovery.</a:t>
-            </a:r>
-            <a:endParaRPr lang="en-US" sz="2400" dirty="0" smtClean="0"/>
+              <a:t>Valuation</a:t>
+            </a:r>
+            <a:r>
+              <a:rPr lang="en-US" sz="2400" dirty="0" smtClean="0"/>
+              <a:t>.</a:t>
+            </a:r>
           </a:p>
           <a:p>
             <a:pPr marL="285750" indent="-285750">
@@ -5675,17 +6585,14 @@
               <a:buChar char="•"/>
             </a:pPr>
             <a:r>
+              <a:rPr lang="en-US" sz="2400" dirty="0"/>
+              <a:t> </a:t>
+            </a:r>
+            <a:r>
               <a:rPr lang="en-US" sz="2400" dirty="0" smtClean="0"/>
-              <a:t> Bike </a:t>
-            </a:r>
-            <a:r>
-              <a:rPr lang="en-US" sz="2400" dirty="0" smtClean="0"/>
-              <a:t>Valuation</a:t>
-            </a:r>
-            <a:r>
-              <a:rPr lang="en-US" sz="2400" dirty="0" smtClean="0"/>
-              <a:t>.</a:t>
-            </a:r>
+              <a:t>Smart Locks.</a:t>
+            </a:r>
+            <a:endParaRPr lang="en-US" sz="2400" dirty="0" smtClean="0"/>
           </a:p>
           <a:p>
             <a:pPr marL="285750" indent="-285750">
@@ -5696,7 +6603,6 @@
               <a:rPr lang="en-US" sz="2400" dirty="0" smtClean="0"/>
               <a:t>QR Codes/NFC Devices.</a:t>
             </a:r>
-            <a:endParaRPr lang="en-US" sz="2400" dirty="0" smtClean="0"/>
           </a:p>
           <a:p>
             <a:endParaRPr lang="en-US" dirty="0"/>

</xml_diff>

<commit_message>
Made a bunch of changes to the wording of the main page, whitepaper and pitch deck.
</commit_message>
<xml_diff>
--- a/BikeDeedPitchDeck.pptx
+++ b/BikeDeedPitchDeck.pptx
@@ -119,7 +119,7 @@
   </p:defaultTextStyle>
   <p:extLst>
     <p:ext uri="{EFAFB233-063F-42B5-8137-9DF3F51BA10A}">
-      <p15:sldGuideLst xmlns:p15="http://schemas.microsoft.com/office/powerpoint/2012/main" xmlns="">
+      <p15:sldGuideLst xmlns="" xmlns:p15="http://schemas.microsoft.com/office/powerpoint/2012/main">
         <p15:guide id="1" orient="horz" pos="2160">
           <p15:clr>
             <a:srgbClr val="A4A3A4"/>
@@ -218,7 +218,7 @@
           <a:p>
             <a:fld id="{28AB948B-60F8-F843-A237-0070858B7880}" type="datetimeFigureOut">
               <a:rPr lang="en-US" smtClean="0"/>
-              <a:t>10/9/18</a:t>
+              <a:t>10/10/18</a:t>
             </a:fld>
             <a:endParaRPr lang="en-US"/>
           </a:p>
@@ -749,7 +749,7 @@
           <a:p>
             <a:fld id="{6BFECD78-3C8E-49F2-8FAB-59489D168ABB}" type="datetimeFigureOut">
               <a:rPr lang="en-US" smtClean="0"/>
-              <a:t>10/9/18</a:t>
+              <a:t>10/10/18</a:t>
             </a:fld>
             <a:endParaRPr lang="en-US" dirty="0"/>
           </a:p>
@@ -917,7 +917,7 @@
           <a:p>
             <a:fld id="{6BFECD78-3C8E-49F2-8FAB-59489D168ABB}" type="datetimeFigureOut">
               <a:rPr lang="en-US" smtClean="0"/>
-              <a:t>10/9/18</a:t>
+              <a:t>10/10/18</a:t>
             </a:fld>
             <a:endParaRPr lang="en-US" dirty="0"/>
           </a:p>
@@ -1095,7 +1095,7 @@
           <a:p>
             <a:fld id="{6BFECD78-3C8E-49F2-8FAB-59489D168ABB}" type="datetimeFigureOut">
               <a:rPr lang="en-US" smtClean="0"/>
-              <a:t>10/9/18</a:t>
+              <a:t>10/10/18</a:t>
             </a:fld>
             <a:endParaRPr lang="en-US" dirty="0"/>
           </a:p>
@@ -1263,7 +1263,7 @@
           <a:p>
             <a:fld id="{6BFECD78-3C8E-49F2-8FAB-59489D168ABB}" type="datetimeFigureOut">
               <a:rPr lang="en-US" smtClean="0"/>
-              <a:t>10/9/18</a:t>
+              <a:t>10/10/18</a:t>
             </a:fld>
             <a:endParaRPr lang="en-US" dirty="0"/>
           </a:p>
@@ -1508,7 +1508,7 @@
           <a:p>
             <a:fld id="{6BFECD78-3C8E-49F2-8FAB-59489D168ABB}" type="datetimeFigureOut">
               <a:rPr lang="en-US" smtClean="0"/>
-              <a:t>10/9/18</a:t>
+              <a:t>10/10/18</a:t>
             </a:fld>
             <a:endParaRPr lang="en-US" dirty="0"/>
           </a:p>
@@ -1793,7 +1793,7 @@
           <a:p>
             <a:fld id="{6BFECD78-3C8E-49F2-8FAB-59489D168ABB}" type="datetimeFigureOut">
               <a:rPr lang="en-US" smtClean="0"/>
-              <a:t>10/9/18</a:t>
+              <a:t>10/10/18</a:t>
             </a:fld>
             <a:endParaRPr lang="en-US" dirty="0"/>
           </a:p>
@@ -2212,7 +2212,7 @@
           <a:p>
             <a:fld id="{6BFECD78-3C8E-49F2-8FAB-59489D168ABB}" type="datetimeFigureOut">
               <a:rPr lang="en-US" smtClean="0"/>
-              <a:t>10/9/18</a:t>
+              <a:t>10/10/18</a:t>
             </a:fld>
             <a:endParaRPr lang="en-US" dirty="0"/>
           </a:p>
@@ -2329,7 +2329,7 @@
           <a:p>
             <a:fld id="{6BFECD78-3C8E-49F2-8FAB-59489D168ABB}" type="datetimeFigureOut">
               <a:rPr lang="en-US" smtClean="0"/>
-              <a:t>10/9/18</a:t>
+              <a:t>10/10/18</a:t>
             </a:fld>
             <a:endParaRPr lang="en-US" dirty="0"/>
           </a:p>
@@ -2424,7 +2424,7 @@
           <a:p>
             <a:fld id="{6BFECD78-3C8E-49F2-8FAB-59489D168ABB}" type="datetimeFigureOut">
               <a:rPr lang="en-US" smtClean="0"/>
-              <a:t>10/9/18</a:t>
+              <a:t>10/10/18</a:t>
             </a:fld>
             <a:endParaRPr lang="en-US" dirty="0"/>
           </a:p>
@@ -2699,7 +2699,7 @@
           <a:p>
             <a:fld id="{6BFECD78-3C8E-49F2-8FAB-59489D168ABB}" type="datetimeFigureOut">
               <a:rPr lang="en-US" smtClean="0"/>
-              <a:t>10/9/18</a:t>
+              <a:t>10/10/18</a:t>
             </a:fld>
             <a:endParaRPr lang="en-US" dirty="0"/>
           </a:p>
@@ -2954,7 +2954,7 @@
           <a:p>
             <a:fld id="{6BFECD78-3C8E-49F2-8FAB-59489D168ABB}" type="datetimeFigureOut">
               <a:rPr lang="en-US" smtClean="0"/>
-              <a:t>10/9/18</a:t>
+              <a:t>10/10/18</a:t>
             </a:fld>
             <a:endParaRPr lang="en-US" dirty="0"/>
           </a:p>
@@ -3165,7 +3165,7 @@
           <a:p>
             <a:fld id="{6BFECD78-3C8E-49F2-8FAB-59489D168ABB}" type="datetimeFigureOut">
               <a:rPr lang="en-US" smtClean="0"/>
-              <a:t>10/9/18</a:t>
+              <a:t>10/10/18</a:t>
             </a:fld>
             <a:endParaRPr lang="en-US" dirty="0"/>
           </a:p>
@@ -3631,7 +3631,7 @@
           <p:cNvPr id="7" name="Picture 6">
             <a:extLst>
               <a:ext uri="{FF2B5EF4-FFF2-40B4-BE49-F238E27FC236}">
-                <a16:creationId xmlns:a16="http://schemas.microsoft.com/office/drawing/2014/main" xmlns="" id="{DEE28063-91C2-4C83-8465-9352D9DA93FB}"/>
+                <a16:creationId xmlns="" xmlns:a16="http://schemas.microsoft.com/office/drawing/2014/main" id="{DEE28063-91C2-4C83-8465-9352D9DA93FB}"/>
               </a:ext>
             </a:extLst>
           </p:cNvPr>
@@ -3819,16 +3819,20 @@
               <a:buNone/>
             </a:pPr>
             <a:r>
+              <a:rPr lang="en-US" dirty="0" smtClean="0"/>
+              <a:t>A functional prototype </a:t>
+            </a:r>
+            <a:r>
+              <a:rPr lang="en-US" dirty="0" err="1" smtClean="0"/>
+              <a:t>dApp</a:t>
+            </a:r>
+            <a:r>
+              <a:rPr lang="en-US" dirty="0" smtClean="0"/>
+              <a:t> is </a:t>
+            </a:r>
+            <a:r>
               <a:rPr lang="en-US" dirty="0"/>
-              <a:t>The </a:t>
-            </a:r>
-            <a:r>
-              <a:rPr lang="en-US" dirty="0" smtClean="0"/>
-              <a:t>Minimal </a:t>
-            </a:r>
-            <a:r>
-              <a:rPr lang="en-US" dirty="0"/>
-              <a:t>Viable Product is up and running on the </a:t>
+              <a:t>up and running on the </a:t>
             </a:r>
             <a:r>
               <a:rPr lang="en-US" dirty="0" err="1"/>
@@ -3870,7 +3874,7 @@
           <p:cNvPr id="6" name="Picture 5">
             <a:extLst>
               <a:ext uri="{FF2B5EF4-FFF2-40B4-BE49-F238E27FC236}">
-                <a16:creationId xmlns:a16="http://schemas.microsoft.com/office/drawing/2014/main" xmlns="" id="{4C24787B-3860-4821-B65F-1B57A65A7EB8}"/>
+                <a16:creationId xmlns="" xmlns:a16="http://schemas.microsoft.com/office/drawing/2014/main" id="{4C24787B-3860-4821-B65F-1B57A65A7EB8}"/>
               </a:ext>
             </a:extLst>
           </p:cNvPr>
@@ -4084,7 +4088,7 @@
         <p:spPr/>
         <p:txBody>
           <a:bodyPr>
-            <a:normAutofit/>
+            <a:normAutofit fontScale="92500" lnSpcReduction="10000"/>
           </a:bodyPr>
           <a:lstStyle/>
           <a:p>
@@ -4148,12 +4152,79 @@
             </a:r>
             <a:r>
               <a:rPr lang="en-US" sz="2000" dirty="0" smtClean="0"/>
-              <a:t>manufactured, shipped, sold and maintained worldwide </a:t>
+              <a:t>manufactured, shipped, sold </a:t>
+            </a:r>
+            <a:r>
+              <a:rPr lang="en-US" sz="2000" smtClean="0"/>
+              <a:t>and </a:t>
+            </a:r>
+            <a:r>
+              <a:rPr lang="en-US" sz="2000" smtClean="0"/>
+              <a:t>serviced </a:t>
+            </a:r>
+            <a:r>
+              <a:rPr lang="en-US" sz="2000" dirty="0" smtClean="0"/>
+              <a:t>worldwide </a:t>
             </a:r>
             <a:r>
               <a:rPr lang="en-US" sz="2000" dirty="0"/>
               <a:t>each year.  </a:t>
             </a:r>
+            <a:endParaRPr lang="en-US" sz="2000" dirty="0" smtClean="0"/>
+          </a:p>
+          <a:p>
+            <a:r>
+              <a:rPr lang="en-US" b="1" dirty="0" smtClean="0">
+                <a:solidFill>
+                  <a:srgbClr val="FFFF00"/>
+                </a:solidFill>
+              </a:rPr>
+              <a:t>Sixty Four Billion </a:t>
+            </a:r>
+            <a:r>
+              <a:rPr lang="en-US" b="1" dirty="0" smtClean="0">
+                <a:solidFill>
+                  <a:schemeClr val="bg1">
+                    <a:lumMod val="75000"/>
+                    <a:lumOff val="25000"/>
+                  </a:schemeClr>
+                </a:solidFill>
+              </a:rPr>
+              <a:t>64,000,000,000</a:t>
+            </a:r>
+            <a:endParaRPr lang="en-US" b="1" dirty="0">
+              <a:solidFill>
+                <a:schemeClr val="bg1">
+                  <a:lumMod val="75000"/>
+                  <a:lumOff val="25000"/>
+                </a:schemeClr>
+              </a:solidFill>
+            </a:endParaRPr>
+          </a:p>
+          <a:p>
+            <a:pPr marL="0" indent="0">
+              <a:buNone/>
+            </a:pPr>
+            <a:r>
+              <a:rPr lang="en-US" sz="2000" dirty="0"/>
+              <a:t> </a:t>
+            </a:r>
+            <a:r>
+              <a:rPr lang="en-US" sz="2000" dirty="0" smtClean="0"/>
+              <a:t>PMR Estimate of size of bicycle product market by year 2024.</a:t>
+            </a:r>
+            <a:r>
+              <a:rPr lang="en-US" sz="2000" b="1" dirty="0" smtClean="0">
+                <a:solidFill>
+                  <a:schemeClr val="bg1">
+                    <a:lumMod val="75000"/>
+                    <a:lumOff val="25000"/>
+                  </a:schemeClr>
+                </a:solidFill>
+              </a:rPr>
+              <a:t>%</a:t>
+            </a:r>
+            <a:endParaRPr lang="en-US" sz="2000" dirty="0"/>
           </a:p>
           <a:p>
             <a:r>
@@ -4356,15 +4427,23 @@
             </a:pPr>
             <a:r>
               <a:rPr lang="en-US" sz="3200" dirty="0" smtClean="0"/>
-              <a:t>There is virtually no authoritative source </a:t>
+              <a:t>There is virtually no authoritative source of information about </a:t>
             </a:r>
             <a:r>
               <a:rPr lang="en-US" sz="3200" dirty="0" smtClean="0"/>
-              <a:t>of information </a:t>
+              <a:t>the individual </a:t>
             </a:r>
             <a:r>
               <a:rPr lang="en-US" sz="3200" dirty="0" smtClean="0"/>
-              <a:t>about individual bikes that are bought, sold, stolen, recovered, or maintained, anywhere in the world.</a:t>
+              <a:t>bikes that are bought, sold, stolen, recovered, or </a:t>
+            </a:r>
+            <a:r>
+              <a:rPr lang="en-US" sz="3200" dirty="0" smtClean="0"/>
+              <a:t>serviced - anywhere </a:t>
+            </a:r>
+            <a:r>
+              <a:rPr lang="en-US" sz="3200" dirty="0" smtClean="0"/>
+              <a:t>in the world.</a:t>
             </a:r>
           </a:p>
           <a:p>
@@ -4508,7 +4587,7 @@
                   <a:srgbClr val="FFFF00"/>
                 </a:solidFill>
               </a:rPr>
-              <a:t>Universal, Public, Borderless </a:t>
+              <a:t>Decentralized, Universal, Borderless </a:t>
             </a:r>
             <a:r>
               <a:rPr lang="en-US" sz="3200" dirty="0" smtClean="0">
@@ -4516,7 +4595,7 @@
                   <a:srgbClr val="FFFFFF"/>
                 </a:solidFill>
               </a:rPr>
-              <a:t>Ecosystem </a:t>
+              <a:t>Repository </a:t>
             </a:r>
             <a:r>
               <a:rPr lang="en-US" sz="3200" dirty="0" smtClean="0">
@@ -4532,7 +4611,7 @@
                   <a:srgbClr val="FFFFFF"/>
                 </a:solidFill>
               </a:rPr>
-              <a:t>Bike </a:t>
+              <a:t>Bicycle </a:t>
             </a:r>
             <a:r>
               <a:rPr lang="en-US" sz="3200" dirty="0" smtClean="0">
@@ -4540,7 +4619,62 @@
                   <a:srgbClr val="FFFFFF"/>
                 </a:solidFill>
               </a:rPr>
-              <a:t>information</a:t>
+              <a:t>information.  </a:t>
+            </a:r>
+          </a:p>
+          <a:p>
+            <a:pPr marL="400050" lvl="1" indent="0">
+              <a:buNone/>
+            </a:pPr>
+            <a:endParaRPr lang="en-US" sz="3200" dirty="0">
+              <a:solidFill>
+                <a:srgbClr val="FFFFFF"/>
+              </a:solidFill>
+            </a:endParaRPr>
+          </a:p>
+          <a:p>
+            <a:pPr marL="400050" lvl="1" indent="0" algn="ctr">
+              <a:buNone/>
+            </a:pPr>
+            <a:r>
+              <a:rPr lang="en-US" sz="3200" dirty="0">
+                <a:solidFill>
+                  <a:srgbClr val="FFFFFF"/>
+                </a:solidFill>
+              </a:rPr>
+              <a:t>A</a:t>
+            </a:r>
+            <a:r>
+              <a:rPr lang="en-US" sz="3200" dirty="0" smtClean="0">
+                <a:solidFill>
+                  <a:srgbClr val="FFFF00"/>
+                </a:solidFill>
+              </a:rPr>
+              <a:t> </a:t>
+            </a:r>
+            <a:r>
+              <a:rPr lang="en-US" sz="3200" dirty="0" err="1" smtClean="0">
+                <a:solidFill>
+                  <a:srgbClr val="FFFFFF"/>
+                </a:solidFill>
+              </a:rPr>
+              <a:t>Carfax</a:t>
+            </a:r>
+            <a:r>
+              <a:rPr lang="en-US" sz="3200" dirty="0">
+                <a:solidFill>
+                  <a:srgbClr val="FFFFFF"/>
+                </a:solidFill>
+              </a:rPr>
+              <a:t> </a:t>
+            </a:r>
+            <a:r>
+              <a:rPr lang="en-US" sz="3200" dirty="0" smtClean="0">
+                <a:solidFill>
+                  <a:srgbClr val="FFFFFF"/>
+                </a:solidFill>
+              </a:rPr>
+              <a:t>for Bikes</a:t>
             </a:r>
             <a:r>
               <a:rPr lang="en-US" sz="3200" dirty="0" smtClean="0">
@@ -4550,52 +4684,13 @@
               </a:rPr>
               <a:t>.  </a:t>
             </a:r>
-          </a:p>
-          <a:p>
-            <a:pPr marL="400050" lvl="1" indent="0">
-              <a:buNone/>
-            </a:pPr>
-            <a:endParaRPr lang="en-US" sz="3200" dirty="0">
-              <a:solidFill>
-                <a:srgbClr val="FFFFFF"/>
-              </a:solidFill>
-            </a:endParaRPr>
-          </a:p>
-          <a:p>
-            <a:pPr marL="400050" lvl="1" indent="0" algn="ctr">
-              <a:buNone/>
-            </a:pPr>
-            <a:r>
-              <a:rPr lang="en-US" sz="3200" dirty="0">
-                <a:solidFill>
-                  <a:srgbClr val="FFFFFF"/>
-                </a:solidFill>
-              </a:rPr>
-              <a:t>A</a:t>
-            </a:r>
             <a:r>
               <a:rPr lang="en-US" sz="3200" dirty="0" smtClean="0">
                 <a:solidFill>
                   <a:srgbClr val="FFFF00"/>
                 </a:solidFill>
               </a:rPr>
-              <a:t> </a:t>
-            </a:r>
-            <a:r>
-              <a:rPr lang="en-US" sz="3200" dirty="0" err="1" smtClean="0">
-                <a:solidFill>
-                  <a:srgbClr val="FFFFFF"/>
-                </a:solidFill>
-              </a:rPr>
-              <a:t>CarFax</a:t>
-            </a:r>
-            <a:r>
-              <a:rPr lang="en-US" sz="3200" dirty="0" smtClean="0">
-                <a:solidFill>
-                  <a:srgbClr val="FFFFFF"/>
-                </a:solidFill>
-              </a:rPr>
-              <a:t> for Bikes, </a:t>
+              <a:t>But </a:t>
             </a:r>
             <a:r>
               <a:rPr lang="en-US" sz="3200" dirty="0" smtClean="0">
@@ -4603,7 +4698,15 @@
                   <a:srgbClr val="FFFF00"/>
                 </a:solidFill>
               </a:rPr>
-              <a:t>only better.</a:t>
+              <a:t>better</a:t>
+            </a:r>
+            <a:r>
+              <a:rPr lang="en-US" sz="3200" dirty="0" smtClean="0">
+                <a:solidFill>
+                  <a:srgbClr val="FFFF00"/>
+                </a:solidFill>
+              </a:rPr>
+              <a:t>.</a:t>
             </a:r>
             <a:endParaRPr lang="en-US" sz="3200" dirty="0"/>
           </a:p>
@@ -4815,7 +4918,7 @@
         <p:spPr/>
         <p:txBody>
           <a:bodyPr>
-            <a:normAutofit fontScale="85000" lnSpcReduction="20000"/>
+            <a:normAutofit fontScale="85000" lnSpcReduction="10000"/>
           </a:bodyPr>
           <a:lstStyle/>
           <a:p>
@@ -4945,66 +5048,15 @@
                   <a:srgbClr val="FFFF00"/>
                 </a:solidFill>
               </a:rPr>
-              <a:t>Big Data  </a:t>
-            </a:r>
-            <a:r>
-              <a:rPr lang="en-US" b="1" dirty="0" smtClean="0">
-                <a:solidFill>
-                  <a:schemeClr val="bg1">
-                    <a:lumMod val="75000"/>
-                    <a:lumOff val="25000"/>
-                  </a:schemeClr>
-                </a:solidFill>
-              </a:rPr>
-              <a:t>Value Added Reseller.  </a:t>
-            </a:r>
-            <a:endParaRPr lang="en-US" b="1" dirty="0">
-              <a:solidFill>
-                <a:schemeClr val="bg1">
-                  <a:lumMod val="75000"/>
-                  <a:lumOff val="25000"/>
-                </a:schemeClr>
-              </a:solidFill>
-            </a:endParaRPr>
-          </a:p>
-          <a:p>
-            <a:pPr marL="0" indent="0">
-              <a:buNone/>
-            </a:pPr>
-            <a:r>
-              <a:rPr lang="en-US" sz="2400" dirty="0"/>
-              <a:t> </a:t>
-            </a:r>
-            <a:r>
-              <a:rPr lang="en-US" sz="2400" dirty="0" smtClean="0"/>
-              <a:t>    Unique niche </a:t>
-            </a:r>
-            <a:r>
-              <a:rPr lang="en-US" sz="2400" dirty="0"/>
-              <a:t>in the value chain </a:t>
-            </a:r>
-            <a:r>
-              <a:rPr lang="en-US" sz="2400" dirty="0" smtClean="0"/>
-              <a:t>for </a:t>
-            </a:r>
-            <a:r>
-              <a:rPr lang="en-US" sz="2400" dirty="0"/>
-              <a:t>maximum sales </a:t>
-            </a:r>
-            <a:r>
-              <a:rPr lang="en-US" sz="2400" dirty="0" smtClean="0"/>
-              <a:t>opportunities.</a:t>
-            </a:r>
-            <a:endParaRPr lang="en-US" dirty="0"/>
-          </a:p>
-          <a:p>
+              <a:t>Insurance </a:t>
+            </a:r>
             <a:r>
               <a:rPr lang="en-US" b="1" dirty="0" smtClean="0">
                 <a:solidFill>
                   <a:srgbClr val="FFFF00"/>
                 </a:solidFill>
               </a:rPr>
-              <a:t>Insurance Referral Partnerships  </a:t>
+              <a:t>Referral Partnerships  </a:t>
             </a:r>
             <a:r>
               <a:rPr lang="en-US" b="1" dirty="0" smtClean="0">
@@ -5061,7 +5113,29 @@
                   </a:schemeClr>
                 </a:solidFill>
               </a:rPr>
-              <a:t>Trust, Cipher, etc.</a:t>
+              <a:t>Trust, </a:t>
+            </a:r>
+            <a:r>
+              <a:rPr lang="en-US" b="1" dirty="0" smtClean="0">
+                <a:solidFill>
+                  <a:schemeClr val="bg1">
+                    <a:lumMod val="75000"/>
+                    <a:lumOff val="25000"/>
+                  </a:schemeClr>
+                </a:solidFill>
+              </a:rPr>
+              <a:t>Cipher</a:t>
+            </a:r>
+            <a:r>
+              <a:rPr lang="en-US" b="1" dirty="0">
+                <a:solidFill>
+                  <a:schemeClr val="bg1">
+                    <a:lumMod val="75000"/>
+                    <a:lumOff val="25000"/>
+                  </a:schemeClr>
+                </a:solidFill>
+              </a:rPr>
+              <a:t>.</a:t>
             </a:r>
             <a:endParaRPr lang="en-US" b="1" dirty="0">
               <a:solidFill>
@@ -5081,6 +5155,37 @@
               <a:t>      Token based crypto compensation for steering users to partner wallets.  </a:t>
             </a:r>
             <a:endParaRPr lang="en-US" sz="2400" dirty="0"/>
+          </a:p>
+          <a:p>
+            <a:r>
+              <a:rPr lang="en-US" b="1" dirty="0">
+                <a:solidFill>
+                  <a:srgbClr val="FFFF00"/>
+                </a:solidFill>
+              </a:rPr>
+              <a:t>Big Data  </a:t>
+            </a:r>
+            <a:r>
+              <a:rPr lang="en-US" b="1" dirty="0">
+                <a:solidFill>
+                  <a:schemeClr val="bg1">
+                    <a:lumMod val="75000"/>
+                    <a:lumOff val="25000"/>
+                  </a:schemeClr>
+                </a:solidFill>
+              </a:rPr>
+              <a:t>Value Added Reseller.  </a:t>
+            </a:r>
+          </a:p>
+          <a:p>
+            <a:pPr marL="0" indent="0">
+              <a:buNone/>
+            </a:pPr>
+            <a:r>
+              <a:rPr lang="en-US" sz="2400" dirty="0"/>
+              <a:t>     Unique niche in the value chain for maximum sales opportunities.</a:t>
+            </a:r>
+            <a:endParaRPr lang="en-US" sz="2000" dirty="0"/>
           </a:p>
           <a:p>
             <a:pPr marL="0" indent="0">
@@ -5171,14 +5276,14 @@
             <p:ph idx="1"/>
             <p:extLst>
               <p:ext uri="{D42A27DB-BD31-4B8C-83A1-F6EECF244321}">
-                <p14:modId xmlns:p14="http://schemas.microsoft.com/office/powerpoint/2010/main" val="4091706570"/>
+                <p14:modId xmlns:p14="http://schemas.microsoft.com/office/powerpoint/2010/main" val="3609772780"/>
               </p:ext>
             </p:extLst>
           </p:nvPr>
         </p:nvGraphicFramePr>
         <p:xfrm>
           <a:off x="457200" y="1652588"/>
-          <a:ext cx="8229600" cy="4683760"/>
+          <a:ext cx="8229600" cy="4414520"/>
         </p:xfrm>
         <a:graphic>
           <a:graphicData uri="http://schemas.openxmlformats.org/drawingml/2006/table">
@@ -5633,11 +5738,15 @@
                     <a:p>
                       <a:r>
                         <a:rPr lang="en-US" dirty="0" smtClean="0"/>
-                        <a:t>Maintenance</a:t>
+                        <a:t>Service</a:t>
                       </a:r>
                       <a:r>
                         <a:rPr lang="en-US" baseline="0" dirty="0" smtClean="0"/>
-                        <a:t> Records</a:t>
+                        <a:t> </a:t>
+                      </a:r>
+                      <a:r>
+                        <a:rPr lang="en-US" baseline="0" dirty="0" smtClean="0"/>
+                        <a:t>Records</a:t>
                       </a:r>
                       <a:endParaRPr lang="en-US" dirty="0"/>
                     </a:p>
@@ -6483,14 +6592,18 @@
               <a:buChar char="•"/>
             </a:pPr>
             <a:r>
+              <a:rPr lang="en-US" sz="2400" dirty="0" smtClean="0"/>
+              <a:t>Proof </a:t>
+            </a:r>
+            <a:r>
               <a:rPr lang="en-US" sz="2400" dirty="0"/>
-              <a:t>Theft and Recovery</a:t>
+              <a:t>of </a:t>
             </a:r>
             <a:r>
               <a:rPr lang="en-US" sz="2400" dirty="0" smtClean="0"/>
-              <a:t>.</a:t>
-            </a:r>
-            <a:endParaRPr lang="en-US" sz="2400" dirty="0" smtClean="0"/>
+              <a:t>Ownership.</a:t>
+            </a:r>
+            <a:endParaRPr lang="en-US" sz="2400" dirty="0"/>
           </a:p>
           <a:p>
             <a:pPr marL="342900" indent="-342900">
@@ -6499,17 +6612,16 @@
             </a:pPr>
             <a:r>
               <a:rPr lang="en-US" sz="2400" dirty="0" smtClean="0"/>
-              <a:t>Proof </a:t>
+              <a:t>Transfer of </a:t>
             </a:r>
             <a:r>
               <a:rPr lang="en-US" sz="2400" dirty="0"/>
-              <a:t>of </a:t>
+              <a:t>Ownership</a:t>
             </a:r>
             <a:r>
               <a:rPr lang="en-US" sz="2400" dirty="0" smtClean="0"/>
-              <a:t>Ownership.</a:t>
-            </a:r>
-            <a:endParaRPr lang="en-US" sz="2400" dirty="0"/>
+              <a:t>.</a:t>
+            </a:r>
           </a:p>
           <a:p>
             <a:pPr marL="342900" indent="-342900">
@@ -6518,15 +6630,7 @@
             </a:pPr>
             <a:r>
               <a:rPr lang="en-US" sz="2400" dirty="0" smtClean="0"/>
-              <a:t>Transfer of </a:t>
-            </a:r>
-            <a:r>
-              <a:rPr lang="en-US" sz="2400" dirty="0"/>
-              <a:t>Ownership</a:t>
-            </a:r>
-            <a:r>
-              <a:rPr lang="en-US" sz="2400" dirty="0" smtClean="0"/>
-              <a:t>.</a:t>
+              <a:t>Bike Searching.</a:t>
             </a:r>
             <a:endParaRPr lang="en-US" sz="2400" dirty="0" smtClean="0"/>
           </a:p>
@@ -6536,8 +6640,12 @@
               <a:buChar char="•"/>
             </a:pPr>
             <a:r>
+              <a:rPr lang="en-US" sz="2400" dirty="0"/>
+              <a:t>Theft and </a:t>
+            </a:r>
+            <a:r>
               <a:rPr lang="en-US" sz="2400" dirty="0" smtClean="0"/>
-              <a:t>Maintenance Tracking.</a:t>
+              <a:t>Recovery.</a:t>
             </a:r>
           </a:p>
           <a:p>
@@ -6546,10 +6654,47 @@
               <a:buChar char="•"/>
             </a:pPr>
             <a:r>
+              <a:rPr lang="en-US" sz="2400" dirty="0"/>
+              <a:t>Bike </a:t>
+            </a:r>
+            <a:r>
               <a:rPr lang="en-US" sz="2400" dirty="0" smtClean="0"/>
-              <a:t>Supply Chain Tracking.</a:t>
-            </a:r>
-            <a:endParaRPr lang="en-US" sz="2400" dirty="0"/>
+              <a:t>Valuation/Validation.</a:t>
+            </a:r>
+            <a:endParaRPr lang="en-US" sz="2400" dirty="0" smtClean="0"/>
+          </a:p>
+          <a:p>
+            <a:pPr marL="342900" indent="-342900">
+              <a:buFont typeface="Arial"/>
+              <a:buChar char="•"/>
+            </a:pPr>
+            <a:r>
+              <a:rPr lang="en-US" sz="2400" dirty="0" smtClean="0"/>
+              <a:t>Service</a:t>
+            </a:r>
+            <a:r>
+              <a:rPr lang="en-US" sz="2400" dirty="0" smtClean="0"/>
+              <a:t> </a:t>
+            </a:r>
+            <a:r>
+              <a:rPr lang="en-US" sz="2400" dirty="0" smtClean="0"/>
+              <a:t>Tracking.</a:t>
+            </a:r>
+          </a:p>
+          <a:p>
+            <a:pPr marL="342900" indent="-342900">
+              <a:buFont typeface="Arial"/>
+              <a:buChar char="•"/>
+            </a:pPr>
+            <a:r>
+              <a:rPr lang="en-US" sz="2400" dirty="0" smtClean="0"/>
+              <a:t>Supply Chain Tracking</a:t>
+            </a:r>
+            <a:r>
+              <a:rPr lang="en-US" sz="2400" dirty="0" smtClean="0"/>
+              <a:t>.</a:t>
+            </a:r>
+            <a:endParaRPr lang="en-US" sz="2400" dirty="0" smtClean="0"/>
           </a:p>
           <a:p>
             <a:pPr marL="285750" indent="-285750">
@@ -6557,34 +6702,6 @@
               <a:buChar char="•"/>
             </a:pPr>
             <a:r>
-              <a:rPr lang="en-US" sz="2400" dirty="0" smtClean="0"/>
-              <a:t> Bike Record Searching.</a:t>
-            </a:r>
-          </a:p>
-          <a:p>
-            <a:pPr marL="285750" indent="-285750">
-              <a:buFont typeface="Arial"/>
-              <a:buChar char="•"/>
-            </a:pPr>
-            <a:r>
-              <a:rPr lang="en-US" sz="2400" dirty="0" smtClean="0"/>
-              <a:t> Bike </a:t>
-            </a:r>
-            <a:r>
-              <a:rPr lang="en-US" sz="2400" dirty="0" smtClean="0"/>
-              <a:t>Valuation</a:t>
-            </a:r>
-            <a:r>
-              <a:rPr lang="en-US" sz="2400" dirty="0" smtClean="0"/>
-              <a:t>.</a:t>
-            </a:r>
-          </a:p>
-          <a:p>
-            <a:pPr marL="285750" indent="-285750">
-              <a:buFont typeface="Arial"/>
-              <a:buChar char="•"/>
-            </a:pPr>
-            <a:r>
               <a:rPr lang="en-US" sz="2400" dirty="0"/>
               <a:t> </a:t>
             </a:r>
@@ -6592,7 +6709,6 @@
               <a:rPr lang="en-US" sz="2400" dirty="0" smtClean="0"/>
               <a:t>Smart Locks.</a:t>
             </a:r>
-            <a:endParaRPr lang="en-US" sz="2400" dirty="0" smtClean="0"/>
           </a:p>
           <a:p>
             <a:pPr marL="285750" indent="-285750">

</xml_diff>